<commit_message>
add tools gui updates
</commit_message>
<xml_diff>
--- a/shenhavArmyNew/Word/פרויקט גמר.pptx
+++ b/shenhavArmyNew/Word/פרויקט גמר.pptx
@@ -18,15 +18,15 @@
     <p:sldId id="261" r:id="rId9"/>
     <p:sldId id="262" r:id="rId10"/>
     <p:sldId id="277" r:id="rId11"/>
-    <p:sldId id="264" r:id="rId12"/>
-    <p:sldId id="265" r:id="rId13"/>
-    <p:sldId id="266" r:id="rId14"/>
-    <p:sldId id="267" r:id="rId15"/>
-    <p:sldId id="268" r:id="rId16"/>
-    <p:sldId id="281" r:id="rId17"/>
-    <p:sldId id="269" r:id="rId18"/>
-    <p:sldId id="270" r:id="rId19"/>
-    <p:sldId id="271" r:id="rId20"/>
+    <p:sldId id="269" r:id="rId12"/>
+    <p:sldId id="267" r:id="rId13"/>
+    <p:sldId id="268" r:id="rId14"/>
+    <p:sldId id="281" r:id="rId15"/>
+    <p:sldId id="270" r:id="rId16"/>
+    <p:sldId id="265" r:id="rId17"/>
+    <p:sldId id="266" r:id="rId18"/>
+    <p:sldId id="271" r:id="rId19"/>
+    <p:sldId id="264" r:id="rId20"/>
     <p:sldId id="272" r:id="rId21"/>
     <p:sldId id="280" r:id="rId22"/>
     <p:sldId id="273" r:id="rId23"/>
@@ -221,7 +221,7 @@
           <a:p>
             <a:fld id="{C84C033A-C372-44B0-9D33-CC8260641A33}" type="datetimeFigureOut">
               <a:rPr lang="en-IL" smtClean="0"/>
-              <a:t>25/04/2021</a:t>
+              <a:t>05/03/2021</a:t>
             </a:fld>
             <a:endParaRPr lang="en-IL"/>
           </a:p>
@@ -719,7 +719,7 @@
             <a:fld id="{B61BEF0D-F0BB-DE4B-95CE-6DB70DBA9567}" type="datetimeFigureOut">
               <a:rPr lang="en-US"/>
               <a:pPr/>
-              <a:t>4/25/2021</a:t>
+              <a:t>5/3/2021</a:t>
             </a:fld>
             <a:endParaRPr lang="en-US"/>
           </a:p>
@@ -1050,7 +1050,7 @@
             <a:fld id="{B61BEF0D-F0BB-DE4B-95CE-6DB70DBA9567}" type="datetimeFigureOut">
               <a:rPr lang="en-US"/>
               <a:pPr/>
-              <a:t>4/25/2021</a:t>
+              <a:t>5/3/2021</a:t>
             </a:fld>
             <a:endParaRPr lang="en-US"/>
           </a:p>
@@ -1325,7 +1325,7 @@
             <a:fld id="{B61BEF0D-F0BB-DE4B-95CE-6DB70DBA9567}" type="datetimeFigureOut">
               <a:rPr lang="en-US"/>
               <a:pPr/>
-              <a:t>4/25/2021</a:t>
+              <a:t>5/3/2021</a:t>
             </a:fld>
             <a:endParaRPr lang="en-US"/>
           </a:p>
@@ -1890,7 +1890,7 @@
             <a:fld id="{B61BEF0D-F0BB-DE4B-95CE-6DB70DBA9567}" type="datetimeFigureOut">
               <a:rPr lang="en-US"/>
               <a:pPr/>
-              <a:t>4/25/2021</a:t>
+              <a:t>5/3/2021</a:t>
             </a:fld>
             <a:endParaRPr lang="en-US"/>
           </a:p>
@@ -2165,7 +2165,7 @@
             <a:fld id="{B61BEF0D-F0BB-DE4B-95CE-6DB70DBA9567}" type="datetimeFigureOut">
               <a:rPr lang="en-US"/>
               <a:pPr/>
-              <a:t>4/25/2021</a:t>
+              <a:t>5/3/2021</a:t>
             </a:fld>
             <a:endParaRPr lang="en-US"/>
           </a:p>
@@ -2724,7 +2724,7 @@
             <a:fld id="{B61BEF0D-F0BB-DE4B-95CE-6DB70DBA9567}" type="datetimeFigureOut">
               <a:rPr lang="en-US"/>
               <a:pPr/>
-              <a:t>4/25/2021</a:t>
+              <a:t>5/3/2021</a:t>
             </a:fld>
             <a:endParaRPr lang="en-US"/>
           </a:p>
@@ -3048,7 +3048,7 @@
             <a:fld id="{B61BEF0D-F0BB-DE4B-95CE-6DB70DBA9567}" type="datetimeFigureOut">
               <a:rPr lang="en-US"/>
               <a:pPr/>
-              <a:t>4/25/2021</a:t>
+              <a:t>5/3/2021</a:t>
             </a:fld>
             <a:endParaRPr lang="en-US"/>
           </a:p>
@@ -3222,7 +3222,7 @@
             <a:fld id="{B61BEF0D-F0BB-DE4B-95CE-6DB70DBA9567}" type="datetimeFigureOut">
               <a:rPr lang="en-US"/>
               <a:pPr/>
-              <a:t>4/25/2021</a:t>
+              <a:t>5/3/2021</a:t>
             </a:fld>
             <a:endParaRPr lang="en-US"/>
           </a:p>
@@ -3457,7 +3457,7 @@
             <a:fld id="{B61BEF0D-F0BB-DE4B-95CE-6DB70DBA9567}" type="datetimeFigureOut">
               <a:rPr lang="en-US"/>
               <a:pPr/>
-              <a:t>4/25/2021</a:t>
+              <a:t>5/3/2021</a:t>
             </a:fld>
             <a:endParaRPr lang="en-US"/>
           </a:p>
@@ -3654,7 +3654,7 @@
             <a:fld id="{B61BEF0D-F0BB-DE4B-95CE-6DB70DBA9567}" type="datetimeFigureOut">
               <a:rPr lang="en-US"/>
               <a:pPr/>
-              <a:t>4/25/2021</a:t>
+              <a:t>5/3/2021</a:t>
             </a:fld>
             <a:endParaRPr lang="en-US"/>
           </a:p>
@@ -3927,7 +3927,7 @@
             <a:fld id="{B61BEF0D-F0BB-DE4B-95CE-6DB70DBA9567}" type="datetimeFigureOut">
               <a:rPr lang="en-US"/>
               <a:pPr/>
-              <a:t>4/25/2021</a:t>
+              <a:t>5/3/2021</a:t>
             </a:fld>
             <a:endParaRPr lang="en-US"/>
           </a:p>
@@ -4190,7 +4190,7 @@
             <a:fld id="{B61BEF0D-F0BB-DE4B-95CE-6DB70DBA9567}" type="datetimeFigureOut">
               <a:rPr lang="en-US"/>
               <a:pPr/>
-              <a:t>4/25/2021</a:t>
+              <a:t>5/3/2021</a:t>
             </a:fld>
             <a:endParaRPr lang="en-US"/>
           </a:p>
@@ -4561,7 +4561,7 @@
             <a:fld id="{B61BEF0D-F0BB-DE4B-95CE-6DB70DBA9567}" type="datetimeFigureOut">
               <a:rPr lang="en-US"/>
               <a:pPr/>
-              <a:t>4/25/2021</a:t>
+              <a:t>5/3/2021</a:t>
             </a:fld>
             <a:endParaRPr lang="en-US"/>
           </a:p>
@@ -4706,7 +4706,7 @@
             <a:fld id="{B61BEF0D-F0BB-DE4B-95CE-6DB70DBA9567}" type="datetimeFigureOut">
               <a:rPr lang="en-US"/>
               <a:pPr/>
-              <a:t>4/25/2021</a:t>
+              <a:t>5/3/2021</a:t>
             </a:fld>
             <a:endParaRPr lang="en-US"/>
           </a:p>
@@ -4828,7 +4828,7 @@
             <a:fld id="{B61BEF0D-F0BB-DE4B-95CE-6DB70DBA9567}" type="datetimeFigureOut">
               <a:rPr lang="en-US"/>
               <a:pPr/>
-              <a:t>4/25/2021</a:t>
+              <a:t>5/3/2021</a:t>
             </a:fld>
             <a:endParaRPr lang="en-US"/>
           </a:p>
@@ -5110,7 +5110,7 @@
             <a:fld id="{B61BEF0D-F0BB-DE4B-95CE-6DB70DBA9567}" type="datetimeFigureOut">
               <a:rPr lang="en-US"/>
               <a:pPr/>
-              <a:t>4/25/2021</a:t>
+              <a:t>5/3/2021</a:t>
             </a:fld>
             <a:endParaRPr lang="en-US"/>
           </a:p>
@@ -5431,7 +5431,7 @@
             <a:fld id="{B61BEF0D-F0BB-DE4B-95CE-6DB70DBA9567}" type="datetimeFigureOut">
               <a:rPr lang="en-US"/>
               <a:pPr/>
-              <a:t>4/25/2021</a:t>
+              <a:t>5/3/2021</a:t>
             </a:fld>
             <a:endParaRPr lang="en-US"/>
           </a:p>
@@ -5642,7 +5642,7 @@
             <a:fld id="{B61BEF0D-F0BB-DE4B-95CE-6DB70DBA9567}" type="datetimeFigureOut">
               <a:rPr lang="en-US"/>
               <a:pPr/>
-              <a:t>4/25/2021</a:t>
+              <a:t>5/3/2021</a:t>
             </a:fld>
             <a:endParaRPr lang="en-US"/>
           </a:p>
@@ -6495,318 +6495,6 @@
 <file path=ppt/slides/slide11.xml><?xml version="1.0" encoding="utf-8"?>
 <p:sld xmlns:a="http://schemas.openxmlformats.org/drawingml/2006/main" xmlns:r="http://schemas.openxmlformats.org/officeDocument/2006/relationships" xmlns:p="http://schemas.openxmlformats.org/presentationml/2006/main">
   <p:cSld>
-    <p:bg>
-      <p:bgPr>
-        <a:blipFill>
-          <a:blip r:embed="rId2"/>
-          <a:stretch/>
-        </a:blipFill>
-        <a:effectLst/>
-      </p:bgPr>
-    </p:bg>
-    <p:spTree>
-      <p:nvGrpSpPr>
-        <p:cNvPr id="1" name=""/>
-        <p:cNvGrpSpPr/>
-        <p:nvPr/>
-      </p:nvGrpSpPr>
-      <p:grpSpPr>
-        <a:xfrm>
-          <a:off x="0" y="0"/>
-          <a:ext cx="0" cy="0"/>
-          <a:chOff x="0" y="0"/>
-          <a:chExt cx="0" cy="0"/>
-        </a:xfrm>
-      </p:grpSpPr>
-      <p:pic>
-        <p:nvPicPr>
-          <p:cNvPr id="8" name="Picture 7">
-            <a:extLst>
-              <a:ext uri="{FF2B5EF4-FFF2-40B4-BE49-F238E27FC236}">
-                <a16:creationId xmlns:a16="http://schemas.microsoft.com/office/drawing/2014/main" id="{CBECFFDC-94DB-4DA3-94FE-22FEDDA8FA30}"/>
-              </a:ext>
-              <a:ext uri="{C183D7F6-B498-43B3-948B-1728B52AA6E4}">
-                <adec:decorative xmlns:adec="http://schemas.microsoft.com/office/drawing/2017/decorative" val="1"/>
-              </a:ext>
-            </a:extLst>
-          </p:cNvPr>
-          <p:cNvPicPr>
-            <a:picLocks noGrp="1" noRot="1" noChangeAspect="1" noMove="1" noResize="1" noEditPoints="1" noAdjustHandles="1" noChangeArrowheads="1" noChangeShapeType="1" noCrop="1"/>
-          </p:cNvPicPr>
-          <p:nvPr>
-            <p:extLst>
-              <p:ext uri="{386F3935-93C4-4BCD-93E2-E3B085C9AB24}">
-                <p16:designElem xmlns:p16="http://schemas.microsoft.com/office/powerpoint/2015/main" val="1"/>
-              </p:ext>
-            </p:extLst>
-          </p:nvPr>
-        </p:nvPicPr>
-        <p:blipFill>
-          <a:blip r:embed="rId3">
-            <a:extLst>
-              <a:ext uri="{28A0092B-C50C-407E-A947-70E740481C1C}">
-                <a14:useLocalDpi xmlns:a14="http://schemas.microsoft.com/office/drawing/2010/main" val="0"/>
-              </a:ext>
-            </a:extLst>
-          </a:blip>
-          <a:stretch>
-            <a:fillRect/>
-          </a:stretch>
-        </p:blipFill>
-        <p:spPr>
-          <a:xfrm>
-            <a:off x="0" y="0"/>
-            <a:ext cx="12188825" cy="6856214"/>
-          </a:xfrm>
-          <a:prstGeom prst="rect">
-            <a:avLst/>
-          </a:prstGeom>
-        </p:spPr>
-      </p:pic>
-      <p:pic>
-        <p:nvPicPr>
-          <p:cNvPr id="10" name="Picture 9">
-            <a:extLst>
-              <a:ext uri="{FF2B5EF4-FFF2-40B4-BE49-F238E27FC236}">
-                <a16:creationId xmlns:a16="http://schemas.microsoft.com/office/drawing/2014/main" id="{F7057E50-1D91-4453-BBA0-DD604B5CDAE4}"/>
-              </a:ext>
-              <a:ext uri="{C183D7F6-B498-43B3-948B-1728B52AA6E4}">
-                <adec:decorative xmlns:adec="http://schemas.microsoft.com/office/drawing/2017/decorative" val="1"/>
-              </a:ext>
-            </a:extLst>
-          </p:cNvPr>
-          <p:cNvPicPr>
-            <a:picLocks noGrp="1" noRot="1" noChangeAspect="1" noMove="1" noResize="1" noEditPoints="1" noAdjustHandles="1" noChangeArrowheads="1" noChangeShapeType="1" noCrop="1"/>
-          </p:cNvPicPr>
-          <p:nvPr>
-            <p:extLst>
-              <p:ext uri="{386F3935-93C4-4BCD-93E2-E3B085C9AB24}">
-                <p16:designElem xmlns:p16="http://schemas.microsoft.com/office/powerpoint/2015/main" val="1"/>
-              </p:ext>
-            </p:extLst>
-          </p:nvPr>
-        </p:nvPicPr>
-        <p:blipFill>
-          <a:blip r:embed="rId4">
-            <a:extLst>
-              <a:ext uri="{28A0092B-C50C-407E-A947-70E740481C1C}">
-                <a14:useLocalDpi xmlns:a14="http://schemas.microsoft.com/office/drawing/2010/main" val="0"/>
-              </a:ext>
-            </a:extLst>
-          </a:blip>
-          <a:stretch>
-            <a:fillRect/>
-          </a:stretch>
-        </p:blipFill>
-        <p:spPr>
-          <a:xfrm>
-            <a:off x="0" y="0"/>
-            <a:ext cx="12188825" cy="6856214"/>
-          </a:xfrm>
-          <a:prstGeom prst="rect">
-            <a:avLst/>
-          </a:prstGeom>
-        </p:spPr>
-      </p:pic>
-      <p:sp>
-        <p:nvSpPr>
-          <p:cNvPr id="2" name="כותרת 1">
-            <a:extLst>
-              <a:ext uri="{FF2B5EF4-FFF2-40B4-BE49-F238E27FC236}">
-                <a16:creationId xmlns:a16="http://schemas.microsoft.com/office/drawing/2014/main" id="{95B1A5C0-2702-4EFE-A226-5049E15E35EA}"/>
-              </a:ext>
-            </a:extLst>
-          </p:cNvPr>
-          <p:cNvSpPr txBox="1">
-            <a:spLocks/>
-          </p:cNvSpPr>
-          <p:nvPr/>
-        </p:nvSpPr>
-        <p:spPr>
-          <a:xfrm>
-            <a:off x="7354027" y="2076234"/>
-            <a:ext cx="4729828" cy="2421464"/>
-          </a:xfrm>
-          <a:prstGeom prst="rect">
-            <a:avLst/>
-          </a:prstGeom>
-        </p:spPr>
-        <p:txBody>
-          <a:bodyPr vert="horz" lIns="91440" tIns="45720" rIns="91440" bIns="45720" rtlCol="0" anchor="b">
-            <a:normAutofit/>
-          </a:bodyPr>
-          <a:lstStyle>
-            <a:lvl1pPr algn="l" defTabSz="457200" rtl="0" eaLnBrk="1" latinLnBrk="0" hangingPunct="1">
-              <a:spcBef>
-                <a:spcPct val="0"/>
-              </a:spcBef>
-              <a:buNone/>
-              <a:defRPr sz="3600" kern="1200" cap="all">
-                <a:ln w="3175" cmpd="sng">
-                  <a:noFill/>
-                </a:ln>
-                <a:solidFill>
-                  <a:schemeClr val="tx1"/>
-                </a:solidFill>
-                <a:effectLst/>
-                <a:latin typeface="+mj-lt"/>
-                <a:ea typeface="+mj-ea"/>
-                <a:cs typeface="+mj-cs"/>
-              </a:defRPr>
-            </a:lvl1pPr>
-            <a:lvl2pPr eaLnBrk="1" hangingPunct="1">
-              <a:defRPr>
-                <a:solidFill>
-                  <a:schemeClr val="tx2"/>
-                </a:solidFill>
-              </a:defRPr>
-            </a:lvl2pPr>
-            <a:lvl3pPr eaLnBrk="1" hangingPunct="1">
-              <a:defRPr>
-                <a:solidFill>
-                  <a:schemeClr val="tx2"/>
-                </a:solidFill>
-              </a:defRPr>
-            </a:lvl3pPr>
-            <a:lvl4pPr eaLnBrk="1" hangingPunct="1">
-              <a:defRPr>
-                <a:solidFill>
-                  <a:schemeClr val="tx2"/>
-                </a:solidFill>
-              </a:defRPr>
-            </a:lvl4pPr>
-            <a:lvl5pPr eaLnBrk="1" hangingPunct="1">
-              <a:defRPr>
-                <a:solidFill>
-                  <a:schemeClr val="tx2"/>
-                </a:solidFill>
-              </a:defRPr>
-            </a:lvl5pPr>
-            <a:lvl6pPr eaLnBrk="1" hangingPunct="1">
-              <a:defRPr>
-                <a:solidFill>
-                  <a:schemeClr val="tx2"/>
-                </a:solidFill>
-              </a:defRPr>
-            </a:lvl6pPr>
-            <a:lvl7pPr eaLnBrk="1" hangingPunct="1">
-              <a:defRPr>
-                <a:solidFill>
-                  <a:schemeClr val="tx2"/>
-                </a:solidFill>
-              </a:defRPr>
-            </a:lvl7pPr>
-            <a:lvl8pPr eaLnBrk="1" hangingPunct="1">
-              <a:defRPr>
-                <a:solidFill>
-                  <a:schemeClr val="tx2"/>
-                </a:solidFill>
-              </a:defRPr>
-            </a:lvl8pPr>
-            <a:lvl9pPr eaLnBrk="1" hangingPunct="1">
-              <a:defRPr>
-                <a:solidFill>
-                  <a:schemeClr val="tx2"/>
-                </a:solidFill>
-              </a:defRPr>
-            </a:lvl9pPr>
-          </a:lstStyle>
-          <a:p>
-            <a:pPr algn="r">
-              <a:spcAft>
-                <a:spcPts val="600"/>
-              </a:spcAft>
-            </a:pPr>
-            <a:r>
-              <a:rPr lang="he-IL" sz="4800"/>
-              <a:t>ארכיטקטורת</a:t>
-            </a:r>
-          </a:p>
-          <a:p>
-            <a:pPr algn="r">
-              <a:spcAft>
-                <a:spcPts val="600"/>
-              </a:spcAft>
-            </a:pPr>
-            <a:r>
-              <a:rPr lang="he-IL" sz="4800"/>
-              <a:t> תכנה</a:t>
-            </a:r>
-            <a:endParaRPr lang="en-US" sz="4800"/>
-          </a:p>
-        </p:txBody>
-      </p:sp>
-      <p:pic>
-        <p:nvPicPr>
-          <p:cNvPr id="2050" name="Picture 2">
-            <a:extLst>
-              <a:ext uri="{FF2B5EF4-FFF2-40B4-BE49-F238E27FC236}">
-                <a16:creationId xmlns:a16="http://schemas.microsoft.com/office/drawing/2014/main" id="{B8968786-65B9-4937-A2D6-A14AD710F555}"/>
-              </a:ext>
-            </a:extLst>
-          </p:cNvPr>
-          <p:cNvPicPr>
-            <a:picLocks noChangeAspect="1" noChangeArrowheads="1"/>
-          </p:cNvPicPr>
-          <p:nvPr/>
-        </p:nvPicPr>
-        <p:blipFill>
-          <a:blip r:embed="rId5">
-            <a:extLst>
-              <a:ext uri="{28A0092B-C50C-407E-A947-70E740481C1C}">
-                <a14:useLocalDpi xmlns:a14="http://schemas.microsoft.com/office/drawing/2010/main" val="0"/>
-              </a:ext>
-            </a:extLst>
-          </a:blip>
-          <a:srcRect/>
-          <a:stretch>
-            <a:fillRect/>
-          </a:stretch>
-        </p:blipFill>
-        <p:spPr bwMode="auto">
-          <a:xfrm>
-            <a:off x="0" y="0"/>
-            <a:ext cx="8308731" cy="6858000"/>
-          </a:xfrm>
-          <a:prstGeom prst="rect">
-            <a:avLst/>
-          </a:prstGeom>
-          <a:noFill/>
-          <a:ln w="6350">
-            <a:solidFill>
-              <a:srgbClr val="000000"/>
-            </a:solidFill>
-            <a:miter lim="800000"/>
-            <a:headEnd/>
-            <a:tailEnd/>
-          </a:ln>
-          <a:extLst>
-            <a:ext uri="{909E8E84-426E-40DD-AFC4-6F175D3DCCD1}">
-              <a14:hiddenFill xmlns:a14="http://schemas.microsoft.com/office/drawing/2010/main">
-                <a:solidFill>
-                  <a:srgbClr val="FFFFFF"/>
-                </a:solidFill>
-              </a14:hiddenFill>
-            </a:ext>
-          </a:extLst>
-        </p:spPr>
-      </p:pic>
-    </p:spTree>
-    <p:extLst>
-      <p:ext uri="{BB962C8B-B14F-4D97-AF65-F5344CB8AC3E}">
-        <p14:creationId xmlns:p14="http://schemas.microsoft.com/office/powerpoint/2010/main" val="863317930"/>
-      </p:ext>
-    </p:extLst>
-  </p:cSld>
-  <p:clrMapOvr>
-    <a:masterClrMapping/>
-  </p:clrMapOvr>
-</p:sld>
-</file>
-
-<file path=ppt/slides/slide12.xml><?xml version="1.0" encoding="utf-8"?>
-<p:sld xmlns:a="http://schemas.openxmlformats.org/drawingml/2006/main" xmlns:r="http://schemas.openxmlformats.org/officeDocument/2006/relationships" xmlns:p="http://schemas.openxmlformats.org/presentationml/2006/main">
-  <p:cSld>
     <p:spTree>
       <p:nvGrpSpPr>
         <p:cNvPr id="1" name=""/>
@@ -6823,10 +6511,10 @@
       </p:grpSpPr>
       <p:sp>
         <p:nvSpPr>
-          <p:cNvPr id="2" name="כותרת 1">
+          <p:cNvPr id="4" name="כותרת 1">
             <a:extLst>
               <a:ext uri="{FF2B5EF4-FFF2-40B4-BE49-F238E27FC236}">
-                <a16:creationId xmlns:a16="http://schemas.microsoft.com/office/drawing/2014/main" id="{E494FDF2-39E4-4C56-81D1-1B404461D38C}"/>
+                <a16:creationId xmlns:a16="http://schemas.microsoft.com/office/drawing/2014/main" id="{C990A99A-1DD6-4D79-992B-C881E0E9D907}"/>
               </a:ext>
             </a:extLst>
           </p:cNvPr>
@@ -6926,7 +6614,7 @@
             <a:pPr algn="r" rtl="1"/>
             <a:r>
               <a:rPr lang="he-IL"/>
-              <a:t>פלטפורמה</a:t>
+              <a:t>כלים </a:t>
             </a:r>
             <a:endParaRPr lang="en-IL"/>
           </a:p>
@@ -6934,10 +6622,10 @@
       </p:sp>
       <p:sp>
         <p:nvSpPr>
-          <p:cNvPr id="3" name="תיבת טקסט 2">
+          <p:cNvPr id="5" name="תיבת טקסט 4">
             <a:extLst>
               <a:ext uri="{FF2B5EF4-FFF2-40B4-BE49-F238E27FC236}">
-                <a16:creationId xmlns:a16="http://schemas.microsoft.com/office/drawing/2014/main" id="{5EC23C1A-33C7-469D-B5AF-790322AE1A17}"/>
+                <a16:creationId xmlns:a16="http://schemas.microsoft.com/office/drawing/2014/main" id="{CB87062D-1A70-4957-BC0E-42BFED3D552A}"/>
               </a:ext>
             </a:extLst>
           </p:cNvPr>
@@ -6947,7 +6635,7 @@
         <p:spPr>
           <a:xfrm>
             <a:off x="1493240" y="1526796"/>
-            <a:ext cx="9555061" cy="4216539"/>
+            <a:ext cx="9555061" cy="3416320"/>
           </a:xfrm>
           <a:prstGeom prst="rect">
             <a:avLst/>
@@ -6962,13 +6650,9 @@
           <a:p>
             <a:pPr algn="r" rtl="1"/>
             <a:r>
-              <a:rPr lang="he-IL" sz="3200"/>
-              <a:t>אחראית על :</a:t>
-            </a:r>
-          </a:p>
-          <a:p>
-            <a:pPr algn="r" rtl="1"/>
-            <a:endParaRPr lang="he-IL" sz="2000"/>
+              <a:rPr lang="he-IL" sz="3600"/>
+              <a:t>אחראיים על :</a:t>
+            </a:r>
           </a:p>
           <a:p>
             <a:pPr marL="342900" indent="-342900" algn="r" rtl="1">
@@ -6976,12 +6660,8 @@
               <a:buChar char="•"/>
             </a:pPr>
             <a:r>
-              <a:rPr lang="en-US" sz="2400"/>
-              <a:t>Connection Module</a:t>
-            </a:r>
-            <a:r>
               <a:rPr lang="he-IL" sz="2400"/>
-              <a:t> - קבלת בקשה מהלקוח והתחלת טיפול לפי דרישותיו של הלקוח.</a:t>
+              <a:t>כל אחד מהכלים דואג לנושא אחר כלומר כל אחד מבצע דבר אחר. לדוגמא : ניהול זיכרון.</a:t>
             </a:r>
           </a:p>
           <a:p>
@@ -6990,28 +6670,16 @@
               <a:buChar char="•"/>
             </a:pPr>
             <a:r>
+              <a:rPr lang="he-IL" sz="2400"/>
+              <a:t>אחראיים על שליחת לוג בחזרה אל ה</a:t>
+            </a:r>
+            <a:r>
               <a:rPr lang="en-US" sz="2400"/>
-              <a:t>Compile Module</a:t>
+              <a:t>REST</a:t>
             </a:r>
             <a:r>
               <a:rPr lang="he-IL" sz="2400"/>
-              <a:t> – בתחילה בדיקה דומה למה שה</a:t>
-            </a:r>
-            <a:r>
-              <a:rPr lang="en-US" sz="2400"/>
-              <a:t>Preprocessor</a:t>
-            </a:r>
-            <a:r>
-              <a:rPr lang="he-IL" sz="2400"/>
-              <a:t> עושה : מסתכל על כל ה</a:t>
-            </a:r>
-            <a:r>
-              <a:rPr lang="en-US" sz="2400"/>
-              <a:t>includes</a:t>
-            </a:r>
-            <a:r>
-              <a:rPr lang="he-IL" sz="2400"/>
-              <a:t> ואוגר סוגי משתנים וכ"ו על הקובץ. לאחר מכן בדיקת קומפילציה בסיסית לגבי הקוד שניתן (אם ישנה בעיית קומפילציה הפלטפורמה תפסיק את הבדיקה תחזיר את התקלה ותגיד באיזה שורה התקלה התרחשה). </a:t>
+              <a:t>.</a:t>
             </a:r>
           </a:p>
           <a:p>
@@ -7020,20 +6688,16 @@
               <a:buChar char="•"/>
             </a:pPr>
             <a:r>
+              <a:rPr lang="he-IL" sz="2400"/>
+              <a:t>יכולים להחזיר קבצי תוצאה אל ה</a:t>
+            </a:r>
+            <a:r>
               <a:rPr lang="en-US" sz="2400"/>
-              <a:t>Parsing Information</a:t>
+              <a:t>REST</a:t>
             </a:r>
             <a:r>
               <a:rPr lang="he-IL" sz="2400"/>
-              <a:t> – במהלך בדיקת הקוד ואחריו אגירת מידע לגבי פונקציות, קוד ואגירתו במילון שלאחר מכן ישלח כ</a:t>
-            </a:r>
-            <a:r>
-              <a:rPr lang="en-US" sz="2400"/>
-              <a:t>JSON</a:t>
-            </a:r>
-            <a:r>
-              <a:rPr lang="he-IL" sz="2400"/>
-              <a:t> לכלים.</a:t>
+              <a:t>.</a:t>
             </a:r>
           </a:p>
           <a:p>
@@ -7042,28 +6706,27 @@
               <a:buChar char="•"/>
             </a:pPr>
             <a:r>
-              <a:rPr lang="en-US" sz="2400"/>
-              <a:t>Json Creation</a:t>
-            </a:r>
-            <a:r>
               <a:rPr lang="he-IL" sz="2400"/>
-              <a:t> – ברגע שהמידע מוכן בניית ה</a:t>
-            </a:r>
-            <a:r>
-              <a:rPr lang="en-US" sz="2400"/>
-              <a:t>JSON</a:t>
-            </a:r>
-            <a:r>
-              <a:rPr lang="he-IL" sz="2400"/>
-              <a:t> במילון.</a:t>
-            </a:r>
+              <a:t>יכולים לבקש תוצאות של כלים אחרים.</a:t>
+            </a:r>
+          </a:p>
+          <a:p>
+            <a:pPr marL="342900" indent="-342900" algn="r" rtl="1">
+              <a:buFont typeface="Arial" panose="020B0604020202020204" pitchFamily="34" charset="0"/>
+              <a:buChar char="•"/>
+            </a:pPr>
+            <a:endParaRPr lang="he-IL" sz="2400"/>
+          </a:p>
+          <a:p>
+            <a:pPr algn="r" rtl="1"/>
+            <a:endParaRPr lang="he-IL" sz="3600"/>
           </a:p>
         </p:txBody>
       </p:sp>
     </p:spTree>
     <p:extLst>
       <p:ext uri="{BB962C8B-B14F-4D97-AF65-F5344CB8AC3E}">
-        <p14:creationId xmlns:p14="http://schemas.microsoft.com/office/powerpoint/2010/main" val="192821504"/>
+        <p14:creationId xmlns:p14="http://schemas.microsoft.com/office/powerpoint/2010/main" val="928927793"/>
       </p:ext>
     </p:extLst>
   </p:cSld>
@@ -7073,247 +6736,7 @@
 </p:sld>
 </file>
 
-<file path=ppt/slides/slide13.xml><?xml version="1.0" encoding="utf-8"?>
-<p:sld xmlns:a="http://schemas.openxmlformats.org/drawingml/2006/main" xmlns:r="http://schemas.openxmlformats.org/officeDocument/2006/relationships" xmlns:p="http://schemas.openxmlformats.org/presentationml/2006/main">
-  <p:cSld>
-    <p:spTree>
-      <p:nvGrpSpPr>
-        <p:cNvPr id="1" name=""/>
-        <p:cNvGrpSpPr/>
-        <p:nvPr/>
-      </p:nvGrpSpPr>
-      <p:grpSpPr>
-        <a:xfrm>
-          <a:off x="0" y="0"/>
-          <a:ext cx="0" cy="0"/>
-          <a:chOff x="0" y="0"/>
-          <a:chExt cx="0" cy="0"/>
-        </a:xfrm>
-      </p:grpSpPr>
-      <p:sp>
-        <p:nvSpPr>
-          <p:cNvPr id="2" name="כותרת 1">
-            <a:extLst>
-              <a:ext uri="{FF2B5EF4-FFF2-40B4-BE49-F238E27FC236}">
-                <a16:creationId xmlns:a16="http://schemas.microsoft.com/office/drawing/2014/main" id="{C1A6DFFC-20B9-4305-9FBB-A7B7B68D29A9}"/>
-              </a:ext>
-            </a:extLst>
-          </p:cNvPr>
-          <p:cNvSpPr txBox="1">
-            <a:spLocks/>
-          </p:cNvSpPr>
-          <p:nvPr/>
-        </p:nvSpPr>
-        <p:spPr>
-          <a:xfrm>
-            <a:off x="820025" y="534100"/>
-            <a:ext cx="10131425" cy="799750"/>
-          </a:xfrm>
-          <a:prstGeom prst="rect">
-            <a:avLst/>
-          </a:prstGeom>
-        </p:spPr>
-        <p:txBody>
-          <a:bodyPr/>
-          <a:lstStyle>
-            <a:lvl1pPr algn="l" defTabSz="457200" rtl="0" eaLnBrk="1" latinLnBrk="0" hangingPunct="1">
-              <a:spcBef>
-                <a:spcPct val="0"/>
-              </a:spcBef>
-              <a:buNone/>
-              <a:defRPr sz="3600" kern="1200" cap="all">
-                <a:ln w="3175" cmpd="sng">
-                  <a:noFill/>
-                </a:ln>
-                <a:solidFill>
-                  <a:schemeClr val="tx1"/>
-                </a:solidFill>
-                <a:effectLst/>
-                <a:latin typeface="+mj-lt"/>
-                <a:ea typeface="+mj-ea"/>
-                <a:cs typeface="+mj-cs"/>
-              </a:defRPr>
-            </a:lvl1pPr>
-            <a:lvl2pPr eaLnBrk="1" hangingPunct="1">
-              <a:defRPr>
-                <a:solidFill>
-                  <a:schemeClr val="tx2"/>
-                </a:solidFill>
-              </a:defRPr>
-            </a:lvl2pPr>
-            <a:lvl3pPr eaLnBrk="1" hangingPunct="1">
-              <a:defRPr>
-                <a:solidFill>
-                  <a:schemeClr val="tx2"/>
-                </a:solidFill>
-              </a:defRPr>
-            </a:lvl3pPr>
-            <a:lvl4pPr eaLnBrk="1" hangingPunct="1">
-              <a:defRPr>
-                <a:solidFill>
-                  <a:schemeClr val="tx2"/>
-                </a:solidFill>
-              </a:defRPr>
-            </a:lvl4pPr>
-            <a:lvl5pPr eaLnBrk="1" hangingPunct="1">
-              <a:defRPr>
-                <a:solidFill>
-                  <a:schemeClr val="tx2"/>
-                </a:solidFill>
-              </a:defRPr>
-            </a:lvl5pPr>
-            <a:lvl6pPr eaLnBrk="1" hangingPunct="1">
-              <a:defRPr>
-                <a:solidFill>
-                  <a:schemeClr val="tx2"/>
-                </a:solidFill>
-              </a:defRPr>
-            </a:lvl6pPr>
-            <a:lvl7pPr eaLnBrk="1" hangingPunct="1">
-              <a:defRPr>
-                <a:solidFill>
-                  <a:schemeClr val="tx2"/>
-                </a:solidFill>
-              </a:defRPr>
-            </a:lvl7pPr>
-            <a:lvl8pPr eaLnBrk="1" hangingPunct="1">
-              <a:defRPr>
-                <a:solidFill>
-                  <a:schemeClr val="tx2"/>
-                </a:solidFill>
-              </a:defRPr>
-            </a:lvl8pPr>
-            <a:lvl9pPr eaLnBrk="1" hangingPunct="1">
-              <a:defRPr>
-                <a:solidFill>
-                  <a:schemeClr val="tx2"/>
-                </a:solidFill>
-              </a:defRPr>
-            </a:lvl9pPr>
-          </a:lstStyle>
-          <a:p>
-            <a:pPr algn="r" rtl="1"/>
-            <a:r>
-              <a:rPr lang="he-IL"/>
-              <a:t>המשך - פלטפורמה</a:t>
-            </a:r>
-            <a:endParaRPr lang="en-IL"/>
-          </a:p>
-        </p:txBody>
-      </p:sp>
-      <p:sp>
-        <p:nvSpPr>
-          <p:cNvPr id="3" name="תיבת טקסט 2">
-            <a:extLst>
-              <a:ext uri="{FF2B5EF4-FFF2-40B4-BE49-F238E27FC236}">
-                <a16:creationId xmlns:a16="http://schemas.microsoft.com/office/drawing/2014/main" id="{5AB950CF-7830-4228-A598-D55910F8AC0A}"/>
-              </a:ext>
-            </a:extLst>
-          </p:cNvPr>
-          <p:cNvSpPr txBox="1"/>
-          <p:nvPr/>
-        </p:nvSpPr>
-        <p:spPr>
-          <a:xfrm>
-            <a:off x="1493240" y="1526796"/>
-            <a:ext cx="9555061" cy="2308324"/>
-          </a:xfrm>
-          <a:prstGeom prst="rect">
-            <a:avLst/>
-          </a:prstGeom>
-          <a:noFill/>
-        </p:spPr>
-        <p:txBody>
-          <a:bodyPr wrap="square" rtlCol="0">
-            <a:spAutoFit/>
-          </a:bodyPr>
-          <a:lstStyle/>
-          <a:p>
-            <a:pPr marL="342900" indent="-342900" algn="r" rtl="1">
-              <a:buFont typeface="Arial" panose="020B0604020202020204" pitchFamily="34" charset="0"/>
-              <a:buChar char="•"/>
-            </a:pPr>
-            <a:r>
-              <a:rPr lang="he-IL" sz="2400"/>
-              <a:t>שליחת המידע ל</a:t>
-            </a:r>
-            <a:r>
-              <a:rPr lang="en-US" sz="2400"/>
-              <a:t>REST</a:t>
-            </a:r>
-            <a:r>
-              <a:rPr lang="he-IL" sz="2400"/>
-              <a:t>.</a:t>
-            </a:r>
-          </a:p>
-          <a:p>
-            <a:pPr marL="342900" indent="-342900" algn="r" rtl="1">
-              <a:buFont typeface="Arial" panose="020B0604020202020204" pitchFamily="34" charset="0"/>
-              <a:buChar char="•"/>
-            </a:pPr>
-            <a:r>
-              <a:rPr lang="he-IL" sz="2400"/>
-              <a:t>הפעלת הכלים בתזמון נכון.</a:t>
-            </a:r>
-          </a:p>
-          <a:p>
-            <a:pPr marL="342900" indent="-342900" algn="r" rtl="1">
-              <a:buFont typeface="Arial" panose="020B0604020202020204" pitchFamily="34" charset="0"/>
-              <a:buChar char="•"/>
-            </a:pPr>
-            <a:r>
-              <a:rPr lang="he-IL" sz="2400"/>
-              <a:t>סידור קובץ </a:t>
-            </a:r>
-            <a:r>
-              <a:rPr lang="en-US" sz="2400"/>
-              <a:t>LOG</a:t>
-            </a:r>
-            <a:r>
-              <a:rPr lang="he-IL" sz="2400"/>
-              <a:t> לגבי תוצאות הכלים.</a:t>
-            </a:r>
-          </a:p>
-          <a:p>
-            <a:pPr marL="342900" indent="-342900" algn="r" rtl="1">
-              <a:buFont typeface="Arial" panose="020B0604020202020204" pitchFamily="34" charset="0"/>
-              <a:buChar char="•"/>
-            </a:pPr>
-            <a:r>
-              <a:rPr lang="en-US" sz="2400"/>
-              <a:t>Tool Handle</a:t>
-            </a:r>
-            <a:r>
-              <a:rPr lang="he-IL" sz="2400"/>
-              <a:t> – וידוא שכל הכלים לא נתקעים ולא עוברים את הזמן המוקצה להם. </a:t>
-            </a:r>
-          </a:p>
-          <a:p>
-            <a:pPr marL="342900" indent="-342900" algn="r" rtl="1">
-              <a:buFont typeface="Arial" panose="020B0604020202020204" pitchFamily="34" charset="0"/>
-              <a:buChar char="•"/>
-            </a:pPr>
-            <a:r>
-              <a:rPr lang="he-IL" sz="2400"/>
-              <a:t>שליחת התוצאה.</a:t>
-            </a:r>
-          </a:p>
-        </p:txBody>
-      </p:sp>
-    </p:spTree>
-    <p:extLst>
-      <p:ext uri="{BB962C8B-B14F-4D97-AF65-F5344CB8AC3E}">
-        <p14:creationId xmlns:p14="http://schemas.microsoft.com/office/powerpoint/2010/main" val="3223398071"/>
-      </p:ext>
-    </p:extLst>
-  </p:cSld>
-  <p:clrMapOvr>
-    <a:masterClrMapping/>
-  </p:clrMapOvr>
-</p:sld>
-</file>
-
-<file path=ppt/slides/slide14.xml><?xml version="1.0" encoding="utf-8"?>
+<file path=ppt/slides/slide12.xml><?xml version="1.0" encoding="utf-8"?>
 <p:sld xmlns:a="http://schemas.openxmlformats.org/drawingml/2006/main" xmlns:r="http://schemas.openxmlformats.org/officeDocument/2006/relationships" xmlns:p="http://schemas.openxmlformats.org/presentationml/2006/main">
   <p:cSld>
     <p:spTree>
@@ -7572,7 +6995,7 @@
 </p:sld>
 </file>
 
-<file path=ppt/slides/slide15.xml><?xml version="1.0" encoding="utf-8"?>
+<file path=ppt/slides/slide13.xml><?xml version="1.0" encoding="utf-8"?>
 <p:sld xmlns:a="http://schemas.openxmlformats.org/drawingml/2006/main" xmlns:r="http://schemas.openxmlformats.org/officeDocument/2006/relationships" xmlns:p="http://schemas.openxmlformats.org/presentationml/2006/main">
   <p:cSld>
     <p:bg>
@@ -8291,7 +7714,7 @@
 </p:sld>
 </file>
 
-<file path=ppt/slides/slide16.xml><?xml version="1.0" encoding="utf-8"?>
+<file path=ppt/slides/slide14.xml><?xml version="1.0" encoding="utf-8"?>
 <p:sld xmlns:a="http://schemas.openxmlformats.org/drawingml/2006/main" xmlns:r="http://schemas.openxmlformats.org/officeDocument/2006/relationships" xmlns:p="http://schemas.openxmlformats.org/presentationml/2006/main">
   <p:cSld>
     <p:spTree>
@@ -8713,251 +8136,7 @@
 </p:sld>
 </file>
 
-<file path=ppt/slides/slide17.xml><?xml version="1.0" encoding="utf-8"?>
-<p:sld xmlns:a="http://schemas.openxmlformats.org/drawingml/2006/main" xmlns:r="http://schemas.openxmlformats.org/officeDocument/2006/relationships" xmlns:p="http://schemas.openxmlformats.org/presentationml/2006/main">
-  <p:cSld>
-    <p:spTree>
-      <p:nvGrpSpPr>
-        <p:cNvPr id="1" name=""/>
-        <p:cNvGrpSpPr/>
-        <p:nvPr/>
-      </p:nvGrpSpPr>
-      <p:grpSpPr>
-        <a:xfrm>
-          <a:off x="0" y="0"/>
-          <a:ext cx="0" cy="0"/>
-          <a:chOff x="0" y="0"/>
-          <a:chExt cx="0" cy="0"/>
-        </a:xfrm>
-      </p:grpSpPr>
-      <p:sp>
-        <p:nvSpPr>
-          <p:cNvPr id="4" name="כותרת 1">
-            <a:extLst>
-              <a:ext uri="{FF2B5EF4-FFF2-40B4-BE49-F238E27FC236}">
-                <a16:creationId xmlns:a16="http://schemas.microsoft.com/office/drawing/2014/main" id="{C990A99A-1DD6-4D79-992B-C881E0E9D907}"/>
-              </a:ext>
-            </a:extLst>
-          </p:cNvPr>
-          <p:cNvSpPr txBox="1">
-            <a:spLocks/>
-          </p:cNvSpPr>
-          <p:nvPr/>
-        </p:nvSpPr>
-        <p:spPr>
-          <a:xfrm>
-            <a:off x="820025" y="534100"/>
-            <a:ext cx="10131425" cy="799750"/>
-          </a:xfrm>
-          <a:prstGeom prst="rect">
-            <a:avLst/>
-          </a:prstGeom>
-        </p:spPr>
-        <p:txBody>
-          <a:bodyPr/>
-          <a:lstStyle>
-            <a:lvl1pPr algn="l" defTabSz="457200" rtl="0" eaLnBrk="1" latinLnBrk="0" hangingPunct="1">
-              <a:spcBef>
-                <a:spcPct val="0"/>
-              </a:spcBef>
-              <a:buNone/>
-              <a:defRPr sz="3600" kern="1200" cap="all">
-                <a:ln w="3175" cmpd="sng">
-                  <a:noFill/>
-                </a:ln>
-                <a:solidFill>
-                  <a:schemeClr val="tx1"/>
-                </a:solidFill>
-                <a:effectLst/>
-                <a:latin typeface="+mj-lt"/>
-                <a:ea typeface="+mj-ea"/>
-                <a:cs typeface="+mj-cs"/>
-              </a:defRPr>
-            </a:lvl1pPr>
-            <a:lvl2pPr eaLnBrk="1" hangingPunct="1">
-              <a:defRPr>
-                <a:solidFill>
-                  <a:schemeClr val="tx2"/>
-                </a:solidFill>
-              </a:defRPr>
-            </a:lvl2pPr>
-            <a:lvl3pPr eaLnBrk="1" hangingPunct="1">
-              <a:defRPr>
-                <a:solidFill>
-                  <a:schemeClr val="tx2"/>
-                </a:solidFill>
-              </a:defRPr>
-            </a:lvl3pPr>
-            <a:lvl4pPr eaLnBrk="1" hangingPunct="1">
-              <a:defRPr>
-                <a:solidFill>
-                  <a:schemeClr val="tx2"/>
-                </a:solidFill>
-              </a:defRPr>
-            </a:lvl4pPr>
-            <a:lvl5pPr eaLnBrk="1" hangingPunct="1">
-              <a:defRPr>
-                <a:solidFill>
-                  <a:schemeClr val="tx2"/>
-                </a:solidFill>
-              </a:defRPr>
-            </a:lvl5pPr>
-            <a:lvl6pPr eaLnBrk="1" hangingPunct="1">
-              <a:defRPr>
-                <a:solidFill>
-                  <a:schemeClr val="tx2"/>
-                </a:solidFill>
-              </a:defRPr>
-            </a:lvl6pPr>
-            <a:lvl7pPr eaLnBrk="1" hangingPunct="1">
-              <a:defRPr>
-                <a:solidFill>
-                  <a:schemeClr val="tx2"/>
-                </a:solidFill>
-              </a:defRPr>
-            </a:lvl7pPr>
-            <a:lvl8pPr eaLnBrk="1" hangingPunct="1">
-              <a:defRPr>
-                <a:solidFill>
-                  <a:schemeClr val="tx2"/>
-                </a:solidFill>
-              </a:defRPr>
-            </a:lvl8pPr>
-            <a:lvl9pPr eaLnBrk="1" hangingPunct="1">
-              <a:defRPr>
-                <a:solidFill>
-                  <a:schemeClr val="tx2"/>
-                </a:solidFill>
-              </a:defRPr>
-            </a:lvl9pPr>
-          </a:lstStyle>
-          <a:p>
-            <a:pPr algn="r" rtl="1"/>
-            <a:r>
-              <a:rPr lang="he-IL"/>
-              <a:t>כלים </a:t>
-            </a:r>
-            <a:endParaRPr lang="en-IL"/>
-          </a:p>
-        </p:txBody>
-      </p:sp>
-      <p:sp>
-        <p:nvSpPr>
-          <p:cNvPr id="5" name="תיבת טקסט 4">
-            <a:extLst>
-              <a:ext uri="{FF2B5EF4-FFF2-40B4-BE49-F238E27FC236}">
-                <a16:creationId xmlns:a16="http://schemas.microsoft.com/office/drawing/2014/main" id="{CB87062D-1A70-4957-BC0E-42BFED3D552A}"/>
-              </a:ext>
-            </a:extLst>
-          </p:cNvPr>
-          <p:cNvSpPr txBox="1"/>
-          <p:nvPr/>
-        </p:nvSpPr>
-        <p:spPr>
-          <a:xfrm>
-            <a:off x="1493240" y="1526796"/>
-            <a:ext cx="9555061" cy="3416320"/>
-          </a:xfrm>
-          <a:prstGeom prst="rect">
-            <a:avLst/>
-          </a:prstGeom>
-          <a:noFill/>
-        </p:spPr>
-        <p:txBody>
-          <a:bodyPr wrap="square" rtlCol="0">
-            <a:spAutoFit/>
-          </a:bodyPr>
-          <a:lstStyle/>
-          <a:p>
-            <a:pPr algn="r" rtl="1"/>
-            <a:r>
-              <a:rPr lang="he-IL" sz="3600"/>
-              <a:t>אחראיים על :</a:t>
-            </a:r>
-          </a:p>
-          <a:p>
-            <a:pPr marL="342900" indent="-342900" algn="r" rtl="1">
-              <a:buFont typeface="Arial" panose="020B0604020202020204" pitchFamily="34" charset="0"/>
-              <a:buChar char="•"/>
-            </a:pPr>
-            <a:r>
-              <a:rPr lang="he-IL" sz="2400"/>
-              <a:t>כל אחד מהכלים דואג לנושא אחר כלומר כל אחד מבצע דבר אחר. לדוגמא : ניהול זיכרון.</a:t>
-            </a:r>
-          </a:p>
-          <a:p>
-            <a:pPr marL="342900" indent="-342900" algn="r" rtl="1">
-              <a:buFont typeface="Arial" panose="020B0604020202020204" pitchFamily="34" charset="0"/>
-              <a:buChar char="•"/>
-            </a:pPr>
-            <a:r>
-              <a:rPr lang="he-IL" sz="2400"/>
-              <a:t>אחראיים על שליחת לוג בחזרה אל ה</a:t>
-            </a:r>
-            <a:r>
-              <a:rPr lang="en-US" sz="2400"/>
-              <a:t>REST</a:t>
-            </a:r>
-            <a:r>
-              <a:rPr lang="he-IL" sz="2400"/>
-              <a:t>.</a:t>
-            </a:r>
-          </a:p>
-          <a:p>
-            <a:pPr marL="342900" indent="-342900" algn="r" rtl="1">
-              <a:buFont typeface="Arial" panose="020B0604020202020204" pitchFamily="34" charset="0"/>
-              <a:buChar char="•"/>
-            </a:pPr>
-            <a:r>
-              <a:rPr lang="he-IL" sz="2400"/>
-              <a:t>יכולים להחזיר קבצי תוצאה אל ה</a:t>
-            </a:r>
-            <a:r>
-              <a:rPr lang="en-US" sz="2400"/>
-              <a:t>REST</a:t>
-            </a:r>
-            <a:r>
-              <a:rPr lang="he-IL" sz="2400"/>
-              <a:t>.</a:t>
-            </a:r>
-          </a:p>
-          <a:p>
-            <a:pPr marL="342900" indent="-342900" algn="r" rtl="1">
-              <a:buFont typeface="Arial" panose="020B0604020202020204" pitchFamily="34" charset="0"/>
-              <a:buChar char="•"/>
-            </a:pPr>
-            <a:r>
-              <a:rPr lang="he-IL" sz="2400"/>
-              <a:t>יכולים לבקש תוצאות של כלים אחרים.</a:t>
-            </a:r>
-          </a:p>
-          <a:p>
-            <a:pPr marL="342900" indent="-342900" algn="r" rtl="1">
-              <a:buFont typeface="Arial" panose="020B0604020202020204" pitchFamily="34" charset="0"/>
-              <a:buChar char="•"/>
-            </a:pPr>
-            <a:endParaRPr lang="he-IL" sz="2400"/>
-          </a:p>
-          <a:p>
-            <a:pPr algn="r" rtl="1"/>
-            <a:endParaRPr lang="he-IL" sz="3600"/>
-          </a:p>
-        </p:txBody>
-      </p:sp>
-    </p:spTree>
-    <p:extLst>
-      <p:ext uri="{BB962C8B-B14F-4D97-AF65-F5344CB8AC3E}">
-        <p14:creationId xmlns:p14="http://schemas.microsoft.com/office/powerpoint/2010/main" val="928927793"/>
-      </p:ext>
-    </p:extLst>
-  </p:cSld>
-  <p:clrMapOvr>
-    <a:masterClrMapping/>
-  </p:clrMapOvr>
-</p:sld>
-</file>
-
-<file path=ppt/slides/slide18.xml><?xml version="1.0" encoding="utf-8"?>
+<file path=ppt/slides/slide15.xml><?xml version="1.0" encoding="utf-8"?>
 <p:sld xmlns:a="http://schemas.openxmlformats.org/drawingml/2006/main" xmlns:r="http://schemas.openxmlformats.org/officeDocument/2006/relationships" xmlns:p="http://schemas.openxmlformats.org/presentationml/2006/main">
   <p:cSld>
     <p:spTree>
@@ -9171,7 +8350,516 @@
 </p:sld>
 </file>
 
-<file path=ppt/slides/slide19.xml><?xml version="1.0" encoding="utf-8"?>
+<file path=ppt/slides/slide16.xml><?xml version="1.0" encoding="utf-8"?>
+<p:sld xmlns:a="http://schemas.openxmlformats.org/drawingml/2006/main" xmlns:r="http://schemas.openxmlformats.org/officeDocument/2006/relationships" xmlns:p="http://schemas.openxmlformats.org/presentationml/2006/main">
+  <p:cSld>
+    <p:spTree>
+      <p:nvGrpSpPr>
+        <p:cNvPr id="1" name=""/>
+        <p:cNvGrpSpPr/>
+        <p:nvPr/>
+      </p:nvGrpSpPr>
+      <p:grpSpPr>
+        <a:xfrm>
+          <a:off x="0" y="0"/>
+          <a:ext cx="0" cy="0"/>
+          <a:chOff x="0" y="0"/>
+          <a:chExt cx="0" cy="0"/>
+        </a:xfrm>
+      </p:grpSpPr>
+      <p:sp>
+        <p:nvSpPr>
+          <p:cNvPr id="2" name="כותרת 1">
+            <a:extLst>
+              <a:ext uri="{FF2B5EF4-FFF2-40B4-BE49-F238E27FC236}">
+                <a16:creationId xmlns:a16="http://schemas.microsoft.com/office/drawing/2014/main" id="{E494FDF2-39E4-4C56-81D1-1B404461D38C}"/>
+              </a:ext>
+            </a:extLst>
+          </p:cNvPr>
+          <p:cNvSpPr txBox="1">
+            <a:spLocks/>
+          </p:cNvSpPr>
+          <p:nvPr/>
+        </p:nvSpPr>
+        <p:spPr>
+          <a:xfrm>
+            <a:off x="820025" y="534100"/>
+            <a:ext cx="10131425" cy="799750"/>
+          </a:xfrm>
+          <a:prstGeom prst="rect">
+            <a:avLst/>
+          </a:prstGeom>
+        </p:spPr>
+        <p:txBody>
+          <a:bodyPr/>
+          <a:lstStyle>
+            <a:lvl1pPr algn="l" defTabSz="457200" rtl="0" eaLnBrk="1" latinLnBrk="0" hangingPunct="1">
+              <a:spcBef>
+                <a:spcPct val="0"/>
+              </a:spcBef>
+              <a:buNone/>
+              <a:defRPr sz="3600" kern="1200" cap="all">
+                <a:ln w="3175" cmpd="sng">
+                  <a:noFill/>
+                </a:ln>
+                <a:solidFill>
+                  <a:schemeClr val="tx1"/>
+                </a:solidFill>
+                <a:effectLst/>
+                <a:latin typeface="+mj-lt"/>
+                <a:ea typeface="+mj-ea"/>
+                <a:cs typeface="+mj-cs"/>
+              </a:defRPr>
+            </a:lvl1pPr>
+            <a:lvl2pPr eaLnBrk="1" hangingPunct="1">
+              <a:defRPr>
+                <a:solidFill>
+                  <a:schemeClr val="tx2"/>
+                </a:solidFill>
+              </a:defRPr>
+            </a:lvl2pPr>
+            <a:lvl3pPr eaLnBrk="1" hangingPunct="1">
+              <a:defRPr>
+                <a:solidFill>
+                  <a:schemeClr val="tx2"/>
+                </a:solidFill>
+              </a:defRPr>
+            </a:lvl3pPr>
+            <a:lvl4pPr eaLnBrk="1" hangingPunct="1">
+              <a:defRPr>
+                <a:solidFill>
+                  <a:schemeClr val="tx2"/>
+                </a:solidFill>
+              </a:defRPr>
+            </a:lvl4pPr>
+            <a:lvl5pPr eaLnBrk="1" hangingPunct="1">
+              <a:defRPr>
+                <a:solidFill>
+                  <a:schemeClr val="tx2"/>
+                </a:solidFill>
+              </a:defRPr>
+            </a:lvl5pPr>
+            <a:lvl6pPr eaLnBrk="1" hangingPunct="1">
+              <a:defRPr>
+                <a:solidFill>
+                  <a:schemeClr val="tx2"/>
+                </a:solidFill>
+              </a:defRPr>
+            </a:lvl6pPr>
+            <a:lvl7pPr eaLnBrk="1" hangingPunct="1">
+              <a:defRPr>
+                <a:solidFill>
+                  <a:schemeClr val="tx2"/>
+                </a:solidFill>
+              </a:defRPr>
+            </a:lvl7pPr>
+            <a:lvl8pPr eaLnBrk="1" hangingPunct="1">
+              <a:defRPr>
+                <a:solidFill>
+                  <a:schemeClr val="tx2"/>
+                </a:solidFill>
+              </a:defRPr>
+            </a:lvl8pPr>
+            <a:lvl9pPr eaLnBrk="1" hangingPunct="1">
+              <a:defRPr>
+                <a:solidFill>
+                  <a:schemeClr val="tx2"/>
+                </a:solidFill>
+              </a:defRPr>
+            </a:lvl9pPr>
+          </a:lstStyle>
+          <a:p>
+            <a:pPr algn="r" rtl="1"/>
+            <a:r>
+              <a:rPr lang="he-IL"/>
+              <a:t>פלטפורמה</a:t>
+            </a:r>
+            <a:endParaRPr lang="en-IL"/>
+          </a:p>
+        </p:txBody>
+      </p:sp>
+      <p:sp>
+        <p:nvSpPr>
+          <p:cNvPr id="3" name="תיבת טקסט 2">
+            <a:extLst>
+              <a:ext uri="{FF2B5EF4-FFF2-40B4-BE49-F238E27FC236}">
+                <a16:creationId xmlns:a16="http://schemas.microsoft.com/office/drawing/2014/main" id="{5EC23C1A-33C7-469D-B5AF-790322AE1A17}"/>
+              </a:ext>
+            </a:extLst>
+          </p:cNvPr>
+          <p:cNvSpPr txBox="1"/>
+          <p:nvPr/>
+        </p:nvSpPr>
+        <p:spPr>
+          <a:xfrm>
+            <a:off x="1493240" y="1526796"/>
+            <a:ext cx="9555061" cy="4216539"/>
+          </a:xfrm>
+          <a:prstGeom prst="rect">
+            <a:avLst/>
+          </a:prstGeom>
+          <a:noFill/>
+        </p:spPr>
+        <p:txBody>
+          <a:bodyPr wrap="square" rtlCol="0">
+            <a:spAutoFit/>
+          </a:bodyPr>
+          <a:lstStyle/>
+          <a:p>
+            <a:pPr algn="r" rtl="1"/>
+            <a:r>
+              <a:rPr lang="he-IL" sz="3200"/>
+              <a:t>אחראית על :</a:t>
+            </a:r>
+          </a:p>
+          <a:p>
+            <a:pPr algn="r" rtl="1"/>
+            <a:endParaRPr lang="he-IL" sz="2000"/>
+          </a:p>
+          <a:p>
+            <a:pPr marL="342900" indent="-342900" algn="r" rtl="1">
+              <a:buFont typeface="Arial" panose="020B0604020202020204" pitchFamily="34" charset="0"/>
+              <a:buChar char="•"/>
+            </a:pPr>
+            <a:r>
+              <a:rPr lang="en-US" sz="2400"/>
+              <a:t>Connection Module</a:t>
+            </a:r>
+            <a:r>
+              <a:rPr lang="he-IL" sz="2400"/>
+              <a:t> - קבלת בקשה מהלקוח והתחלת טיפול לפי דרישותיו של הלקוח.</a:t>
+            </a:r>
+          </a:p>
+          <a:p>
+            <a:pPr marL="342900" indent="-342900" algn="r" rtl="1">
+              <a:buFont typeface="Arial" panose="020B0604020202020204" pitchFamily="34" charset="0"/>
+              <a:buChar char="•"/>
+            </a:pPr>
+            <a:r>
+              <a:rPr lang="en-US" sz="2400"/>
+              <a:t>Compile Module</a:t>
+            </a:r>
+            <a:r>
+              <a:rPr lang="he-IL" sz="2400"/>
+              <a:t> – בתחילה בדיקה דומה למה שה</a:t>
+            </a:r>
+            <a:r>
+              <a:rPr lang="en-US" sz="2400"/>
+              <a:t>Preprocessor</a:t>
+            </a:r>
+            <a:r>
+              <a:rPr lang="he-IL" sz="2400"/>
+              <a:t> עושה : מסתכל על כל ה</a:t>
+            </a:r>
+            <a:r>
+              <a:rPr lang="en-US" sz="2400"/>
+              <a:t>includes</a:t>
+            </a:r>
+            <a:r>
+              <a:rPr lang="he-IL" sz="2400"/>
+              <a:t> ואוגר סוגי משתנים וכ"ו על הקובץ. לאחר מכן בדיקת קומפילציה בסיסית לגבי הקוד שניתן (אם ישנה בעיית קומפילציה הפלטפורמה תפסיק את הבדיקה תחזיר את התקלה ותגיד באיזה שורה התקלה התרחשה). </a:t>
+            </a:r>
+          </a:p>
+          <a:p>
+            <a:pPr marL="342900" indent="-342900" algn="r" rtl="1">
+              <a:buFont typeface="Arial" panose="020B0604020202020204" pitchFamily="34" charset="0"/>
+              <a:buChar char="•"/>
+            </a:pPr>
+            <a:r>
+              <a:rPr lang="en-US" sz="2400"/>
+              <a:t>Parsing Information</a:t>
+            </a:r>
+            <a:r>
+              <a:rPr lang="he-IL" sz="2400"/>
+              <a:t> – במהלך בדיקת הקוד ואחריו אגירת מידע לגבי פונקציות, קוד ואגירתו במילון שלאחר מכן ישלח כ</a:t>
+            </a:r>
+            <a:r>
+              <a:rPr lang="en-US" sz="2400"/>
+              <a:t>JSON</a:t>
+            </a:r>
+            <a:r>
+              <a:rPr lang="he-IL" sz="2400"/>
+              <a:t> לכלים.</a:t>
+            </a:r>
+          </a:p>
+          <a:p>
+            <a:pPr marL="342900" indent="-342900" algn="r" rtl="1">
+              <a:buFont typeface="Arial" panose="020B0604020202020204" pitchFamily="34" charset="0"/>
+              <a:buChar char="•"/>
+            </a:pPr>
+            <a:r>
+              <a:rPr lang="en-US" sz="2400"/>
+              <a:t>Json Creation</a:t>
+            </a:r>
+            <a:r>
+              <a:rPr lang="he-IL" sz="2400"/>
+              <a:t> – ברגע שהמידע מוכן בניית ה</a:t>
+            </a:r>
+            <a:r>
+              <a:rPr lang="en-US" sz="2400"/>
+              <a:t>JSON</a:t>
+            </a:r>
+            <a:r>
+              <a:rPr lang="he-IL" sz="2400"/>
+              <a:t> במילון.</a:t>
+            </a:r>
+          </a:p>
+        </p:txBody>
+      </p:sp>
+    </p:spTree>
+    <p:extLst>
+      <p:ext uri="{BB962C8B-B14F-4D97-AF65-F5344CB8AC3E}">
+        <p14:creationId xmlns:p14="http://schemas.microsoft.com/office/powerpoint/2010/main" val="192821504"/>
+      </p:ext>
+    </p:extLst>
+  </p:cSld>
+  <p:clrMapOvr>
+    <a:masterClrMapping/>
+  </p:clrMapOvr>
+</p:sld>
+</file>
+
+<file path=ppt/slides/slide17.xml><?xml version="1.0" encoding="utf-8"?>
+<p:sld xmlns:a="http://schemas.openxmlformats.org/drawingml/2006/main" xmlns:r="http://schemas.openxmlformats.org/officeDocument/2006/relationships" xmlns:p="http://schemas.openxmlformats.org/presentationml/2006/main">
+  <p:cSld>
+    <p:spTree>
+      <p:nvGrpSpPr>
+        <p:cNvPr id="1" name=""/>
+        <p:cNvGrpSpPr/>
+        <p:nvPr/>
+      </p:nvGrpSpPr>
+      <p:grpSpPr>
+        <a:xfrm>
+          <a:off x="0" y="0"/>
+          <a:ext cx="0" cy="0"/>
+          <a:chOff x="0" y="0"/>
+          <a:chExt cx="0" cy="0"/>
+        </a:xfrm>
+      </p:grpSpPr>
+      <p:sp>
+        <p:nvSpPr>
+          <p:cNvPr id="2" name="כותרת 1">
+            <a:extLst>
+              <a:ext uri="{FF2B5EF4-FFF2-40B4-BE49-F238E27FC236}">
+                <a16:creationId xmlns:a16="http://schemas.microsoft.com/office/drawing/2014/main" id="{C1A6DFFC-20B9-4305-9FBB-A7B7B68D29A9}"/>
+              </a:ext>
+            </a:extLst>
+          </p:cNvPr>
+          <p:cNvSpPr txBox="1">
+            <a:spLocks/>
+          </p:cNvSpPr>
+          <p:nvPr/>
+        </p:nvSpPr>
+        <p:spPr>
+          <a:xfrm>
+            <a:off x="820025" y="534100"/>
+            <a:ext cx="10131425" cy="799750"/>
+          </a:xfrm>
+          <a:prstGeom prst="rect">
+            <a:avLst/>
+          </a:prstGeom>
+        </p:spPr>
+        <p:txBody>
+          <a:bodyPr/>
+          <a:lstStyle>
+            <a:lvl1pPr algn="l" defTabSz="457200" rtl="0" eaLnBrk="1" latinLnBrk="0" hangingPunct="1">
+              <a:spcBef>
+                <a:spcPct val="0"/>
+              </a:spcBef>
+              <a:buNone/>
+              <a:defRPr sz="3600" kern="1200" cap="all">
+                <a:ln w="3175" cmpd="sng">
+                  <a:noFill/>
+                </a:ln>
+                <a:solidFill>
+                  <a:schemeClr val="tx1"/>
+                </a:solidFill>
+                <a:effectLst/>
+                <a:latin typeface="+mj-lt"/>
+                <a:ea typeface="+mj-ea"/>
+                <a:cs typeface="+mj-cs"/>
+              </a:defRPr>
+            </a:lvl1pPr>
+            <a:lvl2pPr eaLnBrk="1" hangingPunct="1">
+              <a:defRPr>
+                <a:solidFill>
+                  <a:schemeClr val="tx2"/>
+                </a:solidFill>
+              </a:defRPr>
+            </a:lvl2pPr>
+            <a:lvl3pPr eaLnBrk="1" hangingPunct="1">
+              <a:defRPr>
+                <a:solidFill>
+                  <a:schemeClr val="tx2"/>
+                </a:solidFill>
+              </a:defRPr>
+            </a:lvl3pPr>
+            <a:lvl4pPr eaLnBrk="1" hangingPunct="1">
+              <a:defRPr>
+                <a:solidFill>
+                  <a:schemeClr val="tx2"/>
+                </a:solidFill>
+              </a:defRPr>
+            </a:lvl4pPr>
+            <a:lvl5pPr eaLnBrk="1" hangingPunct="1">
+              <a:defRPr>
+                <a:solidFill>
+                  <a:schemeClr val="tx2"/>
+                </a:solidFill>
+              </a:defRPr>
+            </a:lvl5pPr>
+            <a:lvl6pPr eaLnBrk="1" hangingPunct="1">
+              <a:defRPr>
+                <a:solidFill>
+                  <a:schemeClr val="tx2"/>
+                </a:solidFill>
+              </a:defRPr>
+            </a:lvl6pPr>
+            <a:lvl7pPr eaLnBrk="1" hangingPunct="1">
+              <a:defRPr>
+                <a:solidFill>
+                  <a:schemeClr val="tx2"/>
+                </a:solidFill>
+              </a:defRPr>
+            </a:lvl7pPr>
+            <a:lvl8pPr eaLnBrk="1" hangingPunct="1">
+              <a:defRPr>
+                <a:solidFill>
+                  <a:schemeClr val="tx2"/>
+                </a:solidFill>
+              </a:defRPr>
+            </a:lvl8pPr>
+            <a:lvl9pPr eaLnBrk="1" hangingPunct="1">
+              <a:defRPr>
+                <a:solidFill>
+                  <a:schemeClr val="tx2"/>
+                </a:solidFill>
+              </a:defRPr>
+            </a:lvl9pPr>
+          </a:lstStyle>
+          <a:p>
+            <a:pPr algn="r" rtl="1"/>
+            <a:r>
+              <a:rPr lang="he-IL"/>
+              <a:t>המשך - פלטפורמה</a:t>
+            </a:r>
+            <a:endParaRPr lang="en-IL"/>
+          </a:p>
+        </p:txBody>
+      </p:sp>
+      <p:sp>
+        <p:nvSpPr>
+          <p:cNvPr id="3" name="תיבת טקסט 2">
+            <a:extLst>
+              <a:ext uri="{FF2B5EF4-FFF2-40B4-BE49-F238E27FC236}">
+                <a16:creationId xmlns:a16="http://schemas.microsoft.com/office/drawing/2014/main" id="{5AB950CF-7830-4228-A598-D55910F8AC0A}"/>
+              </a:ext>
+            </a:extLst>
+          </p:cNvPr>
+          <p:cNvSpPr txBox="1"/>
+          <p:nvPr/>
+        </p:nvSpPr>
+        <p:spPr>
+          <a:xfrm>
+            <a:off x="1493240" y="1526796"/>
+            <a:ext cx="9555061" cy="2308324"/>
+          </a:xfrm>
+          <a:prstGeom prst="rect">
+            <a:avLst/>
+          </a:prstGeom>
+          <a:noFill/>
+        </p:spPr>
+        <p:txBody>
+          <a:bodyPr wrap="square" rtlCol="0">
+            <a:spAutoFit/>
+          </a:bodyPr>
+          <a:lstStyle/>
+          <a:p>
+            <a:pPr marL="342900" indent="-342900" algn="r" rtl="1">
+              <a:buFont typeface="Arial" panose="020B0604020202020204" pitchFamily="34" charset="0"/>
+              <a:buChar char="•"/>
+            </a:pPr>
+            <a:r>
+              <a:rPr lang="he-IL" sz="2400" dirty="0"/>
+              <a:t>שליחת המידע ל</a:t>
+            </a:r>
+            <a:r>
+              <a:rPr lang="en-US" sz="2400" dirty="0"/>
+              <a:t>REST</a:t>
+            </a:r>
+            <a:r>
+              <a:rPr lang="he-IL" sz="2400" dirty="0"/>
+              <a:t>.</a:t>
+            </a:r>
+          </a:p>
+          <a:p>
+            <a:pPr marL="342900" indent="-342900" algn="r" rtl="1">
+              <a:buFont typeface="Arial" panose="020B0604020202020204" pitchFamily="34" charset="0"/>
+              <a:buChar char="•"/>
+            </a:pPr>
+            <a:r>
+              <a:rPr lang="he-IL" sz="2400" dirty="0"/>
+              <a:t>הפעלת הכלים בתזמון נכון.</a:t>
+            </a:r>
+          </a:p>
+          <a:p>
+            <a:pPr marL="342900" indent="-342900" algn="r" rtl="1">
+              <a:buFont typeface="Arial" panose="020B0604020202020204" pitchFamily="34" charset="0"/>
+              <a:buChar char="•"/>
+            </a:pPr>
+            <a:r>
+              <a:rPr lang="he-IL" sz="2400" dirty="0"/>
+              <a:t>סידור קובץ </a:t>
+            </a:r>
+            <a:r>
+              <a:rPr lang="en-US" sz="2400" dirty="0"/>
+              <a:t>LOG</a:t>
+            </a:r>
+            <a:r>
+              <a:rPr lang="he-IL" sz="2400" dirty="0"/>
+              <a:t> לגבי תוצאות הכלים.</a:t>
+            </a:r>
+          </a:p>
+          <a:p>
+            <a:pPr marL="342900" indent="-342900" algn="r" rtl="1">
+              <a:buFont typeface="Arial" panose="020B0604020202020204" pitchFamily="34" charset="0"/>
+              <a:buChar char="•"/>
+            </a:pPr>
+            <a:r>
+              <a:rPr lang="en-US" sz="2400" dirty="0"/>
+              <a:t>Tool Handle</a:t>
+            </a:r>
+            <a:r>
+              <a:rPr lang="he-IL" sz="2400"/>
+              <a:t> – וידוא שכל הכלים לא נתקעים ולא עוברים את הזמן המוקצה להם. </a:t>
+            </a:r>
+          </a:p>
+          <a:p>
+            <a:pPr marL="342900" indent="-342900" algn="r" rtl="1">
+              <a:buFont typeface="Arial" panose="020B0604020202020204" pitchFamily="34" charset="0"/>
+              <a:buChar char="•"/>
+            </a:pPr>
+            <a:r>
+              <a:rPr lang="he-IL" sz="2400" dirty="0"/>
+              <a:t>שליחת התוצאה.</a:t>
+            </a:r>
+          </a:p>
+        </p:txBody>
+      </p:sp>
+    </p:spTree>
+    <p:extLst>
+      <p:ext uri="{BB962C8B-B14F-4D97-AF65-F5344CB8AC3E}">
+        <p14:creationId xmlns:p14="http://schemas.microsoft.com/office/powerpoint/2010/main" val="3223398071"/>
+      </p:ext>
+    </p:extLst>
+  </p:cSld>
+  <p:clrMapOvr>
+    <a:masterClrMapping/>
+  </p:clrMapOvr>
+</p:sld>
+</file>
+
+<file path=ppt/slides/slide18.xml><?xml version="1.0" encoding="utf-8"?>
 <p:sld xmlns:a="http://schemas.openxmlformats.org/drawingml/2006/main" xmlns:r="http://schemas.openxmlformats.org/officeDocument/2006/relationships" xmlns:p="http://schemas.openxmlformats.org/presentationml/2006/main">
   <p:cSld>
     <p:spTree>
@@ -9402,6 +9090,318 @@
 </p:sld>
 </file>
 
+<file path=ppt/slides/slide19.xml><?xml version="1.0" encoding="utf-8"?>
+<p:sld xmlns:a="http://schemas.openxmlformats.org/drawingml/2006/main" xmlns:r="http://schemas.openxmlformats.org/officeDocument/2006/relationships" xmlns:p="http://schemas.openxmlformats.org/presentationml/2006/main">
+  <p:cSld>
+    <p:bg>
+      <p:bgPr>
+        <a:blipFill>
+          <a:blip r:embed="rId2"/>
+          <a:stretch/>
+        </a:blipFill>
+        <a:effectLst/>
+      </p:bgPr>
+    </p:bg>
+    <p:spTree>
+      <p:nvGrpSpPr>
+        <p:cNvPr id="1" name=""/>
+        <p:cNvGrpSpPr/>
+        <p:nvPr/>
+      </p:nvGrpSpPr>
+      <p:grpSpPr>
+        <a:xfrm>
+          <a:off x="0" y="0"/>
+          <a:ext cx="0" cy="0"/>
+          <a:chOff x="0" y="0"/>
+          <a:chExt cx="0" cy="0"/>
+        </a:xfrm>
+      </p:grpSpPr>
+      <p:pic>
+        <p:nvPicPr>
+          <p:cNvPr id="8" name="Picture 7">
+            <a:extLst>
+              <a:ext uri="{FF2B5EF4-FFF2-40B4-BE49-F238E27FC236}">
+                <a16:creationId xmlns:a16="http://schemas.microsoft.com/office/drawing/2014/main" id="{CBECFFDC-94DB-4DA3-94FE-22FEDDA8FA30}"/>
+              </a:ext>
+              <a:ext uri="{C183D7F6-B498-43B3-948B-1728B52AA6E4}">
+                <adec:decorative xmlns:adec="http://schemas.microsoft.com/office/drawing/2017/decorative" xmlns="" val="1"/>
+              </a:ext>
+            </a:extLst>
+          </p:cNvPr>
+          <p:cNvPicPr>
+            <a:picLocks noGrp="1" noRot="1" noChangeAspect="1" noMove="1" noResize="1" noEditPoints="1" noAdjustHandles="1" noChangeArrowheads="1" noChangeShapeType="1" noCrop="1"/>
+          </p:cNvPicPr>
+          <p:nvPr>
+            <p:extLst>
+              <p:ext uri="{386F3935-93C4-4BCD-93E2-E3B085C9AB24}">
+                <p16:designElem xmlns:p16="http://schemas.microsoft.com/office/powerpoint/2015/main" val="1"/>
+              </p:ext>
+            </p:extLst>
+          </p:nvPr>
+        </p:nvPicPr>
+        <p:blipFill>
+          <a:blip r:embed="rId3">
+            <a:extLst>
+              <a:ext uri="{28A0092B-C50C-407E-A947-70E740481C1C}">
+                <a14:useLocalDpi xmlns:a14="http://schemas.microsoft.com/office/drawing/2010/main" val="0"/>
+              </a:ext>
+            </a:extLst>
+          </a:blip>
+          <a:stretch>
+            <a:fillRect/>
+          </a:stretch>
+        </p:blipFill>
+        <p:spPr>
+          <a:xfrm>
+            <a:off x="0" y="0"/>
+            <a:ext cx="12188825" cy="6856214"/>
+          </a:xfrm>
+          <a:prstGeom prst="rect">
+            <a:avLst/>
+          </a:prstGeom>
+        </p:spPr>
+      </p:pic>
+      <p:pic>
+        <p:nvPicPr>
+          <p:cNvPr id="10" name="Picture 9">
+            <a:extLst>
+              <a:ext uri="{FF2B5EF4-FFF2-40B4-BE49-F238E27FC236}">
+                <a16:creationId xmlns:a16="http://schemas.microsoft.com/office/drawing/2014/main" id="{F7057E50-1D91-4453-BBA0-DD604B5CDAE4}"/>
+              </a:ext>
+              <a:ext uri="{C183D7F6-B498-43B3-948B-1728B52AA6E4}">
+                <adec:decorative xmlns:adec="http://schemas.microsoft.com/office/drawing/2017/decorative" xmlns="" val="1"/>
+              </a:ext>
+            </a:extLst>
+          </p:cNvPr>
+          <p:cNvPicPr>
+            <a:picLocks noGrp="1" noRot="1" noChangeAspect="1" noMove="1" noResize="1" noEditPoints="1" noAdjustHandles="1" noChangeArrowheads="1" noChangeShapeType="1" noCrop="1"/>
+          </p:cNvPicPr>
+          <p:nvPr>
+            <p:extLst>
+              <p:ext uri="{386F3935-93C4-4BCD-93E2-E3B085C9AB24}">
+                <p16:designElem xmlns:p16="http://schemas.microsoft.com/office/powerpoint/2015/main" val="1"/>
+              </p:ext>
+            </p:extLst>
+          </p:nvPr>
+        </p:nvPicPr>
+        <p:blipFill>
+          <a:blip r:embed="rId4">
+            <a:extLst>
+              <a:ext uri="{28A0092B-C50C-407E-A947-70E740481C1C}">
+                <a14:useLocalDpi xmlns:a14="http://schemas.microsoft.com/office/drawing/2010/main" val="0"/>
+              </a:ext>
+            </a:extLst>
+          </a:blip>
+          <a:stretch>
+            <a:fillRect/>
+          </a:stretch>
+        </p:blipFill>
+        <p:spPr>
+          <a:xfrm>
+            <a:off x="0" y="0"/>
+            <a:ext cx="12188825" cy="6856214"/>
+          </a:xfrm>
+          <a:prstGeom prst="rect">
+            <a:avLst/>
+          </a:prstGeom>
+        </p:spPr>
+      </p:pic>
+      <p:sp>
+        <p:nvSpPr>
+          <p:cNvPr id="2" name="כותרת 1">
+            <a:extLst>
+              <a:ext uri="{FF2B5EF4-FFF2-40B4-BE49-F238E27FC236}">
+                <a16:creationId xmlns:a16="http://schemas.microsoft.com/office/drawing/2014/main" id="{95B1A5C0-2702-4EFE-A226-5049E15E35EA}"/>
+              </a:ext>
+            </a:extLst>
+          </p:cNvPr>
+          <p:cNvSpPr txBox="1">
+            <a:spLocks/>
+          </p:cNvSpPr>
+          <p:nvPr/>
+        </p:nvSpPr>
+        <p:spPr>
+          <a:xfrm>
+            <a:off x="7354027" y="2076234"/>
+            <a:ext cx="4729828" cy="2421464"/>
+          </a:xfrm>
+          <a:prstGeom prst="rect">
+            <a:avLst/>
+          </a:prstGeom>
+        </p:spPr>
+        <p:txBody>
+          <a:bodyPr vert="horz" lIns="91440" tIns="45720" rIns="91440" bIns="45720" rtlCol="0" anchor="b">
+            <a:normAutofit/>
+          </a:bodyPr>
+          <a:lstStyle>
+            <a:lvl1pPr algn="l" defTabSz="457200" rtl="0" eaLnBrk="1" latinLnBrk="0" hangingPunct="1">
+              <a:spcBef>
+                <a:spcPct val="0"/>
+              </a:spcBef>
+              <a:buNone/>
+              <a:defRPr sz="3600" kern="1200" cap="all">
+                <a:ln w="3175" cmpd="sng">
+                  <a:noFill/>
+                </a:ln>
+                <a:solidFill>
+                  <a:schemeClr val="tx1"/>
+                </a:solidFill>
+                <a:effectLst/>
+                <a:latin typeface="+mj-lt"/>
+                <a:ea typeface="+mj-ea"/>
+                <a:cs typeface="+mj-cs"/>
+              </a:defRPr>
+            </a:lvl1pPr>
+            <a:lvl2pPr eaLnBrk="1" hangingPunct="1">
+              <a:defRPr>
+                <a:solidFill>
+                  <a:schemeClr val="tx2"/>
+                </a:solidFill>
+              </a:defRPr>
+            </a:lvl2pPr>
+            <a:lvl3pPr eaLnBrk="1" hangingPunct="1">
+              <a:defRPr>
+                <a:solidFill>
+                  <a:schemeClr val="tx2"/>
+                </a:solidFill>
+              </a:defRPr>
+            </a:lvl3pPr>
+            <a:lvl4pPr eaLnBrk="1" hangingPunct="1">
+              <a:defRPr>
+                <a:solidFill>
+                  <a:schemeClr val="tx2"/>
+                </a:solidFill>
+              </a:defRPr>
+            </a:lvl4pPr>
+            <a:lvl5pPr eaLnBrk="1" hangingPunct="1">
+              <a:defRPr>
+                <a:solidFill>
+                  <a:schemeClr val="tx2"/>
+                </a:solidFill>
+              </a:defRPr>
+            </a:lvl5pPr>
+            <a:lvl6pPr eaLnBrk="1" hangingPunct="1">
+              <a:defRPr>
+                <a:solidFill>
+                  <a:schemeClr val="tx2"/>
+                </a:solidFill>
+              </a:defRPr>
+            </a:lvl6pPr>
+            <a:lvl7pPr eaLnBrk="1" hangingPunct="1">
+              <a:defRPr>
+                <a:solidFill>
+                  <a:schemeClr val="tx2"/>
+                </a:solidFill>
+              </a:defRPr>
+            </a:lvl7pPr>
+            <a:lvl8pPr eaLnBrk="1" hangingPunct="1">
+              <a:defRPr>
+                <a:solidFill>
+                  <a:schemeClr val="tx2"/>
+                </a:solidFill>
+              </a:defRPr>
+            </a:lvl8pPr>
+            <a:lvl9pPr eaLnBrk="1" hangingPunct="1">
+              <a:defRPr>
+                <a:solidFill>
+                  <a:schemeClr val="tx2"/>
+                </a:solidFill>
+              </a:defRPr>
+            </a:lvl9pPr>
+          </a:lstStyle>
+          <a:p>
+            <a:pPr algn="r">
+              <a:spcAft>
+                <a:spcPts val="600"/>
+              </a:spcAft>
+            </a:pPr>
+            <a:r>
+              <a:rPr lang="he-IL" sz="4800" dirty="0"/>
+              <a:t>ארכיטקטורת</a:t>
+            </a:r>
+          </a:p>
+          <a:p>
+            <a:pPr algn="r">
+              <a:spcAft>
+                <a:spcPts val="600"/>
+              </a:spcAft>
+            </a:pPr>
+            <a:r>
+              <a:rPr lang="he-IL" sz="4800" dirty="0"/>
+              <a:t> תכנה</a:t>
+            </a:r>
+            <a:endParaRPr lang="en-US" sz="4800" dirty="0"/>
+          </a:p>
+        </p:txBody>
+      </p:sp>
+      <p:pic>
+        <p:nvPicPr>
+          <p:cNvPr id="2050" name="Picture 2">
+            <a:extLst>
+              <a:ext uri="{FF2B5EF4-FFF2-40B4-BE49-F238E27FC236}">
+                <a16:creationId xmlns:a16="http://schemas.microsoft.com/office/drawing/2014/main" id="{B8968786-65B9-4937-A2D6-A14AD710F555}"/>
+              </a:ext>
+            </a:extLst>
+          </p:cNvPr>
+          <p:cNvPicPr>
+            <a:picLocks noChangeAspect="1" noChangeArrowheads="1"/>
+          </p:cNvPicPr>
+          <p:nvPr/>
+        </p:nvPicPr>
+        <p:blipFill>
+          <a:blip r:embed="rId5">
+            <a:extLst>
+              <a:ext uri="{28A0092B-C50C-407E-A947-70E740481C1C}">
+                <a14:useLocalDpi xmlns:a14="http://schemas.microsoft.com/office/drawing/2010/main" val="0"/>
+              </a:ext>
+            </a:extLst>
+          </a:blip>
+          <a:srcRect/>
+          <a:stretch>
+            <a:fillRect/>
+          </a:stretch>
+        </p:blipFill>
+        <p:spPr bwMode="auto">
+          <a:xfrm>
+            <a:off x="0" y="0"/>
+            <a:ext cx="8308731" cy="6858000"/>
+          </a:xfrm>
+          <a:prstGeom prst="rect">
+            <a:avLst/>
+          </a:prstGeom>
+          <a:noFill/>
+          <a:ln w="6350">
+            <a:solidFill>
+              <a:srgbClr val="000000"/>
+            </a:solidFill>
+            <a:miter lim="800000"/>
+            <a:headEnd/>
+            <a:tailEnd/>
+          </a:ln>
+          <a:extLst>
+            <a:ext uri="{909E8E84-426E-40DD-AFC4-6F175D3DCCD1}">
+              <a14:hiddenFill xmlns:a14="http://schemas.microsoft.com/office/drawing/2010/main">
+                <a:solidFill>
+                  <a:srgbClr val="FFFFFF"/>
+                </a:solidFill>
+              </a14:hiddenFill>
+            </a:ext>
+          </a:extLst>
+        </p:spPr>
+      </p:pic>
+    </p:spTree>
+    <p:extLst>
+      <p:ext uri="{BB962C8B-B14F-4D97-AF65-F5344CB8AC3E}">
+        <p14:creationId xmlns:p14="http://schemas.microsoft.com/office/powerpoint/2010/main" val="863317930"/>
+      </p:ext>
+    </p:extLst>
+  </p:cSld>
+  <p:clrMapOvr>
+    <a:masterClrMapping/>
+  </p:clrMapOvr>
+</p:sld>
+</file>
+
 <file path=ppt/slides/slide2.xml><?xml version="1.0" encoding="utf-8"?>
 <p:sld xmlns:a="http://schemas.openxmlformats.org/drawingml/2006/main" xmlns:r="http://schemas.openxmlformats.org/officeDocument/2006/relationships" xmlns:p="http://schemas.openxmlformats.org/presentationml/2006/main">
   <p:cSld>
@@ -9580,7 +9580,7 @@
                 <a16:creationId xmlns:a16="http://schemas.microsoft.com/office/drawing/2014/main" id="{6AF6706C-CF07-43A1-BCC4-CBA5D33820DA}"/>
               </a:ext>
               <a:ext uri="{C183D7F6-B498-43B3-948B-1728B52AA6E4}">
-                <adec:decorative xmlns:adec="http://schemas.microsoft.com/office/drawing/2017/decorative" val="1"/>
+                <adec:decorative xmlns:adec="http://schemas.microsoft.com/office/drawing/2017/decorative" xmlns="" val="1"/>
               </a:ext>
             </a:extLst>
           </p:cNvPr>
@@ -10030,7 +10030,7 @@
                 <a16:creationId xmlns:a16="http://schemas.microsoft.com/office/drawing/2014/main" id="{6AF6706C-CF07-43A1-BCC4-CBA5D33820DA}"/>
               </a:ext>
               <a:ext uri="{C183D7F6-B498-43B3-948B-1728B52AA6E4}">
-                <adec:decorative xmlns:adec="http://schemas.microsoft.com/office/drawing/2017/decorative" val="1"/>
+                <adec:decorative xmlns:adec="http://schemas.microsoft.com/office/drawing/2017/decorative" xmlns="" val="1"/>
               </a:ext>
             </a:extLst>
           </p:cNvPr>
@@ -10573,7 +10573,7 @@
                 <a16:creationId xmlns:a16="http://schemas.microsoft.com/office/drawing/2014/main" id="{6AF6706C-CF07-43A1-BCC4-CBA5D33820DA}"/>
               </a:ext>
               <a:ext uri="{C183D7F6-B498-43B3-948B-1728B52AA6E4}">
-                <adec:decorative xmlns:adec="http://schemas.microsoft.com/office/drawing/2017/decorative" val="1"/>
+                <adec:decorative xmlns:adec="http://schemas.microsoft.com/office/drawing/2017/decorative" xmlns="" val="1"/>
               </a:ext>
             </a:extLst>
           </p:cNvPr>
@@ -10859,7 +10859,7 @@
                 <a16:creationId xmlns:a16="http://schemas.microsoft.com/office/drawing/2014/main" id="{6AF6706C-CF07-43A1-BCC4-CBA5D33820DA}"/>
               </a:ext>
               <a:ext uri="{C183D7F6-B498-43B3-948B-1728B52AA6E4}">
-                <adec:decorative xmlns:adec="http://schemas.microsoft.com/office/drawing/2017/decorative" val="1"/>
+                <adec:decorative xmlns:adec="http://schemas.microsoft.com/office/drawing/2017/decorative" xmlns="" val="1"/>
               </a:ext>
             </a:extLst>
           </p:cNvPr>
@@ -11136,7 +11136,7 @@
                 <a16:creationId xmlns:a16="http://schemas.microsoft.com/office/drawing/2014/main" id="{6AF6706C-CF07-43A1-BCC4-CBA5D33820DA}"/>
               </a:ext>
               <a:ext uri="{C183D7F6-B498-43B3-948B-1728B52AA6E4}">
-                <adec:decorative xmlns:adec="http://schemas.microsoft.com/office/drawing/2017/decorative" val="1"/>
+                <adec:decorative xmlns:adec="http://schemas.microsoft.com/office/drawing/2017/decorative" xmlns="" val="1"/>
               </a:ext>
             </a:extLst>
           </p:cNvPr>
@@ -11181,7 +11181,7 @@
                 <a16:creationId xmlns:a16="http://schemas.microsoft.com/office/drawing/2014/main" id="{1F94DC1C-47D1-41D7-8B1B-9A036D614027}"/>
               </a:ext>
               <a:ext uri="{C183D7F6-B498-43B3-948B-1728B52AA6E4}">
-                <adec:decorative xmlns:adec="http://schemas.microsoft.com/office/drawing/2017/decorative" val="1"/>
+                <adec:decorative xmlns:adec="http://schemas.microsoft.com/office/drawing/2017/decorative" xmlns="" val="1"/>
               </a:ext>
             </a:extLst>
           </p:cNvPr>
@@ -11241,7 +11241,7 @@
                 <a16:creationId xmlns:a16="http://schemas.microsoft.com/office/drawing/2014/main" id="{811383CE-CE86-4E1C-B289-798EB9E6E0E5}"/>
               </a:ext>
               <a:ext uri="{C183D7F6-B498-43B3-948B-1728B52AA6E4}">
-                <adec:decorative xmlns:adec="http://schemas.microsoft.com/office/drawing/2017/decorative" val="1"/>
+                <adec:decorative xmlns:adec="http://schemas.microsoft.com/office/drawing/2017/decorative" xmlns="" val="1"/>
               </a:ext>
             </a:extLst>
           </p:cNvPr>
@@ -11325,7 +11325,7 @@
                 <a16:creationId xmlns:a16="http://schemas.microsoft.com/office/drawing/2014/main" id="{AC12A592-C02D-46EF-8E1F-9335DB8D71DF}"/>
               </a:ext>
               <a:ext uri="{C183D7F6-B498-43B3-948B-1728B52AA6E4}">
-                <adec:decorative xmlns:adec="http://schemas.microsoft.com/office/drawing/2017/decorative" val="1"/>
+                <adec:decorative xmlns:adec="http://schemas.microsoft.com/office/drawing/2017/decorative" xmlns="" val="1"/>
               </a:ext>
             </a:extLst>
           </p:cNvPr>
@@ -11483,7 +11483,7 @@
                 <a16:creationId xmlns:a16="http://schemas.microsoft.com/office/drawing/2014/main" id="{24005816-5BCA-4665-8A58-5580F8E9C84A}"/>
               </a:ext>
               <a:ext uri="{C183D7F6-B498-43B3-948B-1728B52AA6E4}">
-                <adec:decorative xmlns:adec="http://schemas.microsoft.com/office/drawing/2017/decorative" val="1"/>
+                <adec:decorative xmlns:adec="http://schemas.microsoft.com/office/drawing/2017/decorative" xmlns="" val="1"/>
               </a:ext>
             </a:extLst>
           </p:cNvPr>
@@ -11675,7 +11675,7 @@
                 <a16:creationId xmlns:a16="http://schemas.microsoft.com/office/drawing/2014/main" id="{BF07F359-8CA3-4854-91E7-EE6004020511}"/>
               </a:ext>
               <a:ext uri="{C183D7F6-B498-43B3-948B-1728B52AA6E4}">
-                <adec:decorative xmlns:adec="http://schemas.microsoft.com/office/drawing/2017/decorative" val="1"/>
+                <adec:decorative xmlns:adec="http://schemas.microsoft.com/office/drawing/2017/decorative" xmlns="" val="1"/>
               </a:ext>
             </a:extLst>
           </p:cNvPr>
@@ -11706,7 +11706,7 @@
                   <a16:creationId xmlns:a16="http://schemas.microsoft.com/office/drawing/2014/main" id="{8A7FCE86-4904-4337-8D0A-3ABA73F609EF}"/>
                 </a:ext>
                 <a:ext uri="{C183D7F6-B498-43B3-948B-1728B52AA6E4}">
-                  <adec:decorative xmlns:adec="http://schemas.microsoft.com/office/drawing/2017/decorative" val="1"/>
+                  <adec:decorative xmlns:adec="http://schemas.microsoft.com/office/drawing/2017/decorative" xmlns="" val="1"/>
                 </a:ext>
               </a:extLst>
             </p:cNvPr>
@@ -11758,7 +11758,7 @@
                   <a16:creationId xmlns:a16="http://schemas.microsoft.com/office/drawing/2014/main" id="{BA32C234-504D-411A-A62B-C1CFD8CE74D5}"/>
                 </a:ext>
                 <a:ext uri="{C183D7F6-B498-43B3-948B-1728B52AA6E4}">
-                  <adec:decorative xmlns:adec="http://schemas.microsoft.com/office/drawing/2017/decorative" val="1"/>
+                  <adec:decorative xmlns:adec="http://schemas.microsoft.com/office/drawing/2017/decorative" xmlns="" val="1"/>
                 </a:ext>
               </a:extLst>
             </p:cNvPr>
@@ -11810,7 +11810,7 @@
                   <a16:creationId xmlns:a16="http://schemas.microsoft.com/office/drawing/2014/main" id="{881593A9-FD94-454C-9225-478E90706132}"/>
                 </a:ext>
                 <a:ext uri="{C183D7F6-B498-43B3-948B-1728B52AA6E4}">
-                  <adec:decorative xmlns:adec="http://schemas.microsoft.com/office/drawing/2017/decorative" val="1"/>
+                  <adec:decorative xmlns:adec="http://schemas.microsoft.com/office/drawing/2017/decorative" xmlns="" val="1"/>
                 </a:ext>
               </a:extLst>
             </p:cNvPr>
@@ -11862,7 +11862,7 @@
                   <a16:creationId xmlns:a16="http://schemas.microsoft.com/office/drawing/2014/main" id="{FA3524A1-6DED-4D15-ADE5-F797DBCEC728}"/>
                 </a:ext>
                 <a:ext uri="{C183D7F6-B498-43B3-948B-1728B52AA6E4}">
-                  <adec:decorative xmlns:adec="http://schemas.microsoft.com/office/drawing/2017/decorative" val="1"/>
+                  <adec:decorative xmlns:adec="http://schemas.microsoft.com/office/drawing/2017/decorative" xmlns="" val="1"/>
                 </a:ext>
               </a:extLst>
             </p:cNvPr>
@@ -11914,7 +11914,7 @@
                   <a16:creationId xmlns:a16="http://schemas.microsoft.com/office/drawing/2014/main" id="{AA8491CF-856E-4A54-84A5-45C558D41A7B}"/>
                 </a:ext>
                 <a:ext uri="{C183D7F6-B498-43B3-948B-1728B52AA6E4}">
-                  <adec:decorative xmlns:adec="http://schemas.microsoft.com/office/drawing/2017/decorative" val="1"/>
+                  <adec:decorative xmlns:adec="http://schemas.microsoft.com/office/drawing/2017/decorative" xmlns="" val="1"/>
                 </a:ext>
               </a:extLst>
             </p:cNvPr>
@@ -11966,7 +11966,7 @@
                   <a16:creationId xmlns:a16="http://schemas.microsoft.com/office/drawing/2014/main" id="{AD63A388-BF18-4ABD-96E0-5946B1ABB1D6}"/>
                 </a:ext>
                 <a:ext uri="{C183D7F6-B498-43B3-948B-1728B52AA6E4}">
-                  <adec:decorative xmlns:adec="http://schemas.microsoft.com/office/drawing/2017/decorative" val="1"/>
+                  <adec:decorative xmlns:adec="http://schemas.microsoft.com/office/drawing/2017/decorative" xmlns="" val="1"/>
                 </a:ext>
               </a:extLst>
             </p:cNvPr>
@@ -12018,7 +12018,7 @@
                   <a16:creationId xmlns:a16="http://schemas.microsoft.com/office/drawing/2014/main" id="{9CF6D779-BD20-4058-AC29-AF4E2510C2C2}"/>
                 </a:ext>
                 <a:ext uri="{C183D7F6-B498-43B3-948B-1728B52AA6E4}">
-                  <adec:decorative xmlns:adec="http://schemas.microsoft.com/office/drawing/2017/decorative" val="1"/>
+                  <adec:decorative xmlns:adec="http://schemas.microsoft.com/office/drawing/2017/decorative" xmlns="" val="1"/>
                 </a:ext>
               </a:extLst>
             </p:cNvPr>
@@ -12070,7 +12070,7 @@
                   <a16:creationId xmlns:a16="http://schemas.microsoft.com/office/drawing/2014/main" id="{4189C0F2-FCB0-4636-9B05-F9FCBB2020A6}"/>
                 </a:ext>
                 <a:ext uri="{C183D7F6-B498-43B3-948B-1728B52AA6E4}">
-                  <adec:decorative xmlns:adec="http://schemas.microsoft.com/office/drawing/2017/decorative" val="1"/>
+                  <adec:decorative xmlns:adec="http://schemas.microsoft.com/office/drawing/2017/decorative" xmlns="" val="1"/>
                 </a:ext>
               </a:extLst>
             </p:cNvPr>
@@ -12122,7 +12122,7 @@
                   <a16:creationId xmlns:a16="http://schemas.microsoft.com/office/drawing/2014/main" id="{E74CB59A-0AC3-4235-A93D-73EE12466967}"/>
                 </a:ext>
                 <a:ext uri="{C183D7F6-B498-43B3-948B-1728B52AA6E4}">
-                  <adec:decorative xmlns:adec="http://schemas.microsoft.com/office/drawing/2017/decorative" val="1"/>
+                  <adec:decorative xmlns:adec="http://schemas.microsoft.com/office/drawing/2017/decorative" xmlns="" val="1"/>
                 </a:ext>
               </a:extLst>
             </p:cNvPr>
@@ -12174,7 +12174,7 @@
                   <a16:creationId xmlns:a16="http://schemas.microsoft.com/office/drawing/2014/main" id="{2B6E97A3-E95A-4D79-A8F8-1945EA2634FB}"/>
                 </a:ext>
                 <a:ext uri="{C183D7F6-B498-43B3-948B-1728B52AA6E4}">
-                  <adec:decorative xmlns:adec="http://schemas.microsoft.com/office/drawing/2017/decorative" val="1"/>
+                  <adec:decorative xmlns:adec="http://schemas.microsoft.com/office/drawing/2017/decorative" xmlns="" val="1"/>
                 </a:ext>
               </a:extLst>
             </p:cNvPr>
@@ -12226,7 +12226,7 @@
                   <a16:creationId xmlns:a16="http://schemas.microsoft.com/office/drawing/2014/main" id="{9F4ABF86-0905-4DE8-8F0B-D10D3D6F9C41}"/>
                 </a:ext>
                 <a:ext uri="{C183D7F6-B498-43B3-948B-1728B52AA6E4}">
-                  <adec:decorative xmlns:adec="http://schemas.microsoft.com/office/drawing/2017/decorative" val="1"/>
+                  <adec:decorative xmlns:adec="http://schemas.microsoft.com/office/drawing/2017/decorative" xmlns="" val="1"/>
                 </a:ext>
               </a:extLst>
             </p:cNvPr>
@@ -12278,7 +12278,7 @@
                   <a16:creationId xmlns:a16="http://schemas.microsoft.com/office/drawing/2014/main" id="{4FAAFEF7-DFA1-48C7-9E4E-FF7B1453C718}"/>
                 </a:ext>
                 <a:ext uri="{C183D7F6-B498-43B3-948B-1728B52AA6E4}">
-                  <adec:decorative xmlns:adec="http://schemas.microsoft.com/office/drawing/2017/decorative" val="1"/>
+                  <adec:decorative xmlns:adec="http://schemas.microsoft.com/office/drawing/2017/decorative" xmlns="" val="1"/>
                 </a:ext>
               </a:extLst>
             </p:cNvPr>
@@ -12330,7 +12330,7 @@
                   <a16:creationId xmlns:a16="http://schemas.microsoft.com/office/drawing/2014/main" id="{ED828735-DFD9-4894-8461-77A2FB0C9276}"/>
                 </a:ext>
                 <a:ext uri="{C183D7F6-B498-43B3-948B-1728B52AA6E4}">
-                  <adec:decorative xmlns:adec="http://schemas.microsoft.com/office/drawing/2017/decorative" val="1"/>
+                  <adec:decorative xmlns:adec="http://schemas.microsoft.com/office/drawing/2017/decorative" xmlns="" val="1"/>
                 </a:ext>
               </a:extLst>
             </p:cNvPr>
@@ -12382,7 +12382,7 @@
                   <a16:creationId xmlns:a16="http://schemas.microsoft.com/office/drawing/2014/main" id="{7A6C2585-E93E-489D-8819-FCEE3CFF11C5}"/>
                 </a:ext>
                 <a:ext uri="{C183D7F6-B498-43B3-948B-1728B52AA6E4}">
-                  <adec:decorative xmlns:adec="http://schemas.microsoft.com/office/drawing/2017/decorative" val="1"/>
+                  <adec:decorative xmlns:adec="http://schemas.microsoft.com/office/drawing/2017/decorative" xmlns="" val="1"/>
                 </a:ext>
               </a:extLst>
             </p:cNvPr>
@@ -12434,7 +12434,7 @@
                   <a16:creationId xmlns:a16="http://schemas.microsoft.com/office/drawing/2014/main" id="{E57C1F25-FC5C-4082-B4F6-888F8E467EE5}"/>
                 </a:ext>
                 <a:ext uri="{C183D7F6-B498-43B3-948B-1728B52AA6E4}">
-                  <adec:decorative xmlns:adec="http://schemas.microsoft.com/office/drawing/2017/decorative" val="1"/>
+                  <adec:decorative xmlns:adec="http://schemas.microsoft.com/office/drawing/2017/decorative" xmlns="" val="1"/>
                 </a:ext>
               </a:extLst>
             </p:cNvPr>
@@ -12486,7 +12486,7 @@
                   <a16:creationId xmlns:a16="http://schemas.microsoft.com/office/drawing/2014/main" id="{F5DF4BDB-CA1D-4DA1-8D26-6BAEE0A21AE7}"/>
                 </a:ext>
                 <a:ext uri="{C183D7F6-B498-43B3-948B-1728B52AA6E4}">
-                  <adec:decorative xmlns:adec="http://schemas.microsoft.com/office/drawing/2017/decorative" val="1"/>
+                  <adec:decorative xmlns:adec="http://schemas.microsoft.com/office/drawing/2017/decorative" xmlns="" val="1"/>
                 </a:ext>
               </a:extLst>
             </p:cNvPr>
@@ -12538,7 +12538,7 @@
                   <a16:creationId xmlns:a16="http://schemas.microsoft.com/office/drawing/2014/main" id="{3315D2A0-DDA4-4A25-9CC7-7F90CCF0C409}"/>
                 </a:ext>
                 <a:ext uri="{C183D7F6-B498-43B3-948B-1728B52AA6E4}">
-                  <adec:decorative xmlns:adec="http://schemas.microsoft.com/office/drawing/2017/decorative" val="1"/>
+                  <adec:decorative xmlns:adec="http://schemas.microsoft.com/office/drawing/2017/decorative" xmlns="" val="1"/>
                 </a:ext>
               </a:extLst>
             </p:cNvPr>
@@ -12590,7 +12590,7 @@
                   <a16:creationId xmlns:a16="http://schemas.microsoft.com/office/drawing/2014/main" id="{75312B72-7E7D-4B0B-960E-7D7C9540EBDC}"/>
                 </a:ext>
                 <a:ext uri="{C183D7F6-B498-43B3-948B-1728B52AA6E4}">
-                  <adec:decorative xmlns:adec="http://schemas.microsoft.com/office/drawing/2017/decorative" val="1"/>
+                  <adec:decorative xmlns:adec="http://schemas.microsoft.com/office/drawing/2017/decorative" xmlns="" val="1"/>
                 </a:ext>
               </a:extLst>
             </p:cNvPr>
@@ -12642,7 +12642,7 @@
                   <a16:creationId xmlns:a16="http://schemas.microsoft.com/office/drawing/2014/main" id="{C48B42BB-3C0E-4546-957B-AB593E308C93}"/>
                 </a:ext>
                 <a:ext uri="{C183D7F6-B498-43B3-948B-1728B52AA6E4}">
-                  <adec:decorative xmlns:adec="http://schemas.microsoft.com/office/drawing/2017/decorative" val="1"/>
+                  <adec:decorative xmlns:adec="http://schemas.microsoft.com/office/drawing/2017/decorative" xmlns="" val="1"/>
                 </a:ext>
               </a:extLst>
             </p:cNvPr>
@@ -12694,7 +12694,7 @@
                   <a16:creationId xmlns:a16="http://schemas.microsoft.com/office/drawing/2014/main" id="{437809D5-5F69-4BC6-A661-44B2A8A68220}"/>
                 </a:ext>
                 <a:ext uri="{C183D7F6-B498-43B3-948B-1728B52AA6E4}">
-                  <adec:decorative xmlns:adec="http://schemas.microsoft.com/office/drawing/2017/decorative" val="1"/>
+                  <adec:decorative xmlns:adec="http://schemas.microsoft.com/office/drawing/2017/decorative" xmlns="" val="1"/>
                 </a:ext>
               </a:extLst>
             </p:cNvPr>
@@ -12746,7 +12746,7 @@
                   <a16:creationId xmlns:a16="http://schemas.microsoft.com/office/drawing/2014/main" id="{B269CB4C-8BB5-4F63-8961-7EB8FE56D44A}"/>
                 </a:ext>
                 <a:ext uri="{C183D7F6-B498-43B3-948B-1728B52AA6E4}">
-                  <adec:decorative xmlns:adec="http://schemas.microsoft.com/office/drawing/2017/decorative" val="1"/>
+                  <adec:decorative xmlns:adec="http://schemas.microsoft.com/office/drawing/2017/decorative" xmlns="" val="1"/>
                 </a:ext>
               </a:extLst>
             </p:cNvPr>
@@ -12798,7 +12798,7 @@
                   <a16:creationId xmlns:a16="http://schemas.microsoft.com/office/drawing/2014/main" id="{D5E7B60C-3F52-49EA-99F5-BE42AF88DD33}"/>
                 </a:ext>
                 <a:ext uri="{C183D7F6-B498-43B3-948B-1728B52AA6E4}">
-                  <adec:decorative xmlns:adec="http://schemas.microsoft.com/office/drawing/2017/decorative" val="1"/>
+                  <adec:decorative xmlns:adec="http://schemas.microsoft.com/office/drawing/2017/decorative" xmlns="" val="1"/>
                 </a:ext>
               </a:extLst>
             </p:cNvPr>
@@ -12850,7 +12850,7 @@
                   <a16:creationId xmlns:a16="http://schemas.microsoft.com/office/drawing/2014/main" id="{1C5E885C-0F0D-4E11-8B78-4CE951E26921}"/>
                 </a:ext>
                 <a:ext uri="{C183D7F6-B498-43B3-948B-1728B52AA6E4}">
-                  <adec:decorative xmlns:adec="http://schemas.microsoft.com/office/drawing/2017/decorative" val="1"/>
+                  <adec:decorative xmlns:adec="http://schemas.microsoft.com/office/drawing/2017/decorative" xmlns="" val="1"/>
                 </a:ext>
               </a:extLst>
             </p:cNvPr>
@@ -12902,7 +12902,7 @@
                   <a16:creationId xmlns:a16="http://schemas.microsoft.com/office/drawing/2014/main" id="{4BFA6E20-F564-4CA4-9150-FDD50B02CD24}"/>
                 </a:ext>
                 <a:ext uri="{C183D7F6-B498-43B3-948B-1728B52AA6E4}">
-                  <adec:decorative xmlns:adec="http://schemas.microsoft.com/office/drawing/2017/decorative" val="1"/>
+                  <adec:decorative xmlns:adec="http://schemas.microsoft.com/office/drawing/2017/decorative" xmlns="" val="1"/>
                 </a:ext>
               </a:extLst>
             </p:cNvPr>
@@ -12954,7 +12954,7 @@
                   <a16:creationId xmlns:a16="http://schemas.microsoft.com/office/drawing/2014/main" id="{C3C02C6B-B913-486F-ACAE-432DE1F7704D}"/>
                 </a:ext>
                 <a:ext uri="{C183D7F6-B498-43B3-948B-1728B52AA6E4}">
-                  <adec:decorative xmlns:adec="http://schemas.microsoft.com/office/drawing/2017/decorative" val="1"/>
+                  <adec:decorative xmlns:adec="http://schemas.microsoft.com/office/drawing/2017/decorative" xmlns="" val="1"/>
                 </a:ext>
               </a:extLst>
             </p:cNvPr>
@@ -13006,7 +13006,7 @@
                   <a16:creationId xmlns:a16="http://schemas.microsoft.com/office/drawing/2014/main" id="{B6B5EE64-D401-45A4-82D4-85D4BF5C8EC6}"/>
                 </a:ext>
                 <a:ext uri="{C183D7F6-B498-43B3-948B-1728B52AA6E4}">
-                  <adec:decorative xmlns:adec="http://schemas.microsoft.com/office/drawing/2017/decorative" val="1"/>
+                  <adec:decorative xmlns:adec="http://schemas.microsoft.com/office/drawing/2017/decorative" xmlns="" val="1"/>
                 </a:ext>
               </a:extLst>
             </p:cNvPr>
@@ -13058,7 +13058,7 @@
                   <a16:creationId xmlns:a16="http://schemas.microsoft.com/office/drawing/2014/main" id="{5F622D05-678C-405E-A74F-8D92A9C64438}"/>
                 </a:ext>
                 <a:ext uri="{C183D7F6-B498-43B3-948B-1728B52AA6E4}">
-                  <adec:decorative xmlns:adec="http://schemas.microsoft.com/office/drawing/2017/decorative" val="1"/>
+                  <adec:decorative xmlns:adec="http://schemas.microsoft.com/office/drawing/2017/decorative" xmlns="" val="1"/>
                 </a:ext>
               </a:extLst>
             </p:cNvPr>
@@ -13110,7 +13110,7 @@
                   <a16:creationId xmlns:a16="http://schemas.microsoft.com/office/drawing/2014/main" id="{D8E01EF1-6517-49CC-9891-1BD6D0F49D00}"/>
                 </a:ext>
                 <a:ext uri="{C183D7F6-B498-43B3-948B-1728B52AA6E4}">
-                  <adec:decorative xmlns:adec="http://schemas.microsoft.com/office/drawing/2017/decorative" val="1"/>
+                  <adec:decorative xmlns:adec="http://schemas.microsoft.com/office/drawing/2017/decorative" xmlns="" val="1"/>
                 </a:ext>
               </a:extLst>
             </p:cNvPr>
@@ -13162,7 +13162,7 @@
                   <a16:creationId xmlns:a16="http://schemas.microsoft.com/office/drawing/2014/main" id="{EC93E79A-63A6-4782-9D2C-BC50CD3B9444}"/>
                 </a:ext>
                 <a:ext uri="{C183D7F6-B498-43B3-948B-1728B52AA6E4}">
-                  <adec:decorative xmlns:adec="http://schemas.microsoft.com/office/drawing/2017/decorative" val="1"/>
+                  <adec:decorative xmlns:adec="http://schemas.microsoft.com/office/drawing/2017/decorative" xmlns="" val="1"/>
                 </a:ext>
               </a:extLst>
             </p:cNvPr>
@@ -13214,7 +13214,7 @@
                   <a16:creationId xmlns:a16="http://schemas.microsoft.com/office/drawing/2014/main" id="{46C4B4DB-9B57-4C69-96EB-3E1910CEF40A}"/>
                 </a:ext>
                 <a:ext uri="{C183D7F6-B498-43B3-948B-1728B52AA6E4}">
-                  <adec:decorative xmlns:adec="http://schemas.microsoft.com/office/drawing/2017/decorative" val="1"/>
+                  <adec:decorative xmlns:adec="http://schemas.microsoft.com/office/drawing/2017/decorative" xmlns="" val="1"/>
                 </a:ext>
               </a:extLst>
             </p:cNvPr>
@@ -13266,7 +13266,7 @@
                   <a16:creationId xmlns:a16="http://schemas.microsoft.com/office/drawing/2014/main" id="{9BBDCDA7-4ECB-42B1-8524-3D30023D6B68}"/>
                 </a:ext>
                 <a:ext uri="{C183D7F6-B498-43B3-948B-1728B52AA6E4}">
-                  <adec:decorative xmlns:adec="http://schemas.microsoft.com/office/drawing/2017/decorative" val="1"/>
+                  <adec:decorative xmlns:adec="http://schemas.microsoft.com/office/drawing/2017/decorative" xmlns="" val="1"/>
                 </a:ext>
               </a:extLst>
             </p:cNvPr>
@@ -13318,7 +13318,7 @@
                   <a16:creationId xmlns:a16="http://schemas.microsoft.com/office/drawing/2014/main" id="{C7483057-DCDA-4BC6-8E99-7EAD94E8786A}"/>
                 </a:ext>
                 <a:ext uri="{C183D7F6-B498-43B3-948B-1728B52AA6E4}">
-                  <adec:decorative xmlns:adec="http://schemas.microsoft.com/office/drawing/2017/decorative" val="1"/>
+                  <adec:decorative xmlns:adec="http://schemas.microsoft.com/office/drawing/2017/decorative" xmlns="" val="1"/>
                 </a:ext>
               </a:extLst>
             </p:cNvPr>
@@ -13370,7 +13370,7 @@
                   <a16:creationId xmlns:a16="http://schemas.microsoft.com/office/drawing/2014/main" id="{E5C35A56-0BFD-443F-8C2B-CA73A3BFE9E5}"/>
                 </a:ext>
                 <a:ext uri="{C183D7F6-B498-43B3-948B-1728B52AA6E4}">
-                  <adec:decorative xmlns:adec="http://schemas.microsoft.com/office/drawing/2017/decorative" val="1"/>
+                  <adec:decorative xmlns:adec="http://schemas.microsoft.com/office/drawing/2017/decorative" xmlns="" val="1"/>
                 </a:ext>
               </a:extLst>
             </p:cNvPr>
@@ -13422,7 +13422,7 @@
                   <a16:creationId xmlns:a16="http://schemas.microsoft.com/office/drawing/2014/main" id="{214A0AE5-3A88-4D5D-845C-5E906888C81F}"/>
                 </a:ext>
                 <a:ext uri="{C183D7F6-B498-43B3-948B-1728B52AA6E4}">
-                  <adec:decorative xmlns:adec="http://schemas.microsoft.com/office/drawing/2017/decorative" val="1"/>
+                  <adec:decorative xmlns:adec="http://schemas.microsoft.com/office/drawing/2017/decorative" xmlns="" val="1"/>
                 </a:ext>
               </a:extLst>
             </p:cNvPr>
@@ -13474,7 +13474,7 @@
                   <a16:creationId xmlns:a16="http://schemas.microsoft.com/office/drawing/2014/main" id="{44D7BF13-EDB8-4740-A3C5-87E2E7C67669}"/>
                 </a:ext>
                 <a:ext uri="{C183D7F6-B498-43B3-948B-1728B52AA6E4}">
-                  <adec:decorative xmlns:adec="http://schemas.microsoft.com/office/drawing/2017/decorative" val="1"/>
+                  <adec:decorative xmlns:adec="http://schemas.microsoft.com/office/drawing/2017/decorative" xmlns="" val="1"/>
                 </a:ext>
               </a:extLst>
             </p:cNvPr>
@@ -13526,7 +13526,7 @@
                   <a16:creationId xmlns:a16="http://schemas.microsoft.com/office/drawing/2014/main" id="{16DAB64F-4B49-434F-BFB6-0BEB41AFB610}"/>
                 </a:ext>
                 <a:ext uri="{C183D7F6-B498-43B3-948B-1728B52AA6E4}">
-                  <adec:decorative xmlns:adec="http://schemas.microsoft.com/office/drawing/2017/decorative" val="1"/>
+                  <adec:decorative xmlns:adec="http://schemas.microsoft.com/office/drawing/2017/decorative" xmlns="" val="1"/>
                 </a:ext>
               </a:extLst>
             </p:cNvPr>
@@ -13578,7 +13578,7 @@
                   <a16:creationId xmlns:a16="http://schemas.microsoft.com/office/drawing/2014/main" id="{93B5AD9A-BDA6-42CE-A1C0-C07210307227}"/>
                 </a:ext>
                 <a:ext uri="{C183D7F6-B498-43B3-948B-1728B52AA6E4}">
-                  <adec:decorative xmlns:adec="http://schemas.microsoft.com/office/drawing/2017/decorative" val="1"/>
+                  <adec:decorative xmlns:adec="http://schemas.microsoft.com/office/drawing/2017/decorative" xmlns="" val="1"/>
                 </a:ext>
               </a:extLst>
             </p:cNvPr>
@@ -13630,7 +13630,7 @@
                   <a16:creationId xmlns:a16="http://schemas.microsoft.com/office/drawing/2014/main" id="{5FD67DCC-475F-4BED-A634-FCDD63176BB5}"/>
                 </a:ext>
                 <a:ext uri="{C183D7F6-B498-43B3-948B-1728B52AA6E4}">
-                  <adec:decorative xmlns:adec="http://schemas.microsoft.com/office/drawing/2017/decorative" val="1"/>
+                  <adec:decorative xmlns:adec="http://schemas.microsoft.com/office/drawing/2017/decorative" xmlns="" val="1"/>
                 </a:ext>
               </a:extLst>
             </p:cNvPr>
@@ -13682,7 +13682,7 @@
                   <a16:creationId xmlns:a16="http://schemas.microsoft.com/office/drawing/2014/main" id="{ED276E23-C86D-408D-821A-1E9A44CAEAFC}"/>
                 </a:ext>
                 <a:ext uri="{C183D7F6-B498-43B3-948B-1728B52AA6E4}">
-                  <adec:decorative xmlns:adec="http://schemas.microsoft.com/office/drawing/2017/decorative" val="1"/>
+                  <adec:decorative xmlns:adec="http://schemas.microsoft.com/office/drawing/2017/decorative" xmlns="" val="1"/>
                 </a:ext>
               </a:extLst>
             </p:cNvPr>
@@ -13734,7 +13734,7 @@
                   <a16:creationId xmlns:a16="http://schemas.microsoft.com/office/drawing/2014/main" id="{A879A029-D911-41C4-B218-E41871762F3A}"/>
                 </a:ext>
                 <a:ext uri="{C183D7F6-B498-43B3-948B-1728B52AA6E4}">
-                  <adec:decorative xmlns:adec="http://schemas.microsoft.com/office/drawing/2017/decorative" val="1"/>
+                  <adec:decorative xmlns:adec="http://schemas.microsoft.com/office/drawing/2017/decorative" xmlns="" val="1"/>
                 </a:ext>
               </a:extLst>
             </p:cNvPr>
@@ -13786,7 +13786,7 @@
                   <a16:creationId xmlns:a16="http://schemas.microsoft.com/office/drawing/2014/main" id="{E9C7C9F5-65FB-4EF9-9AAD-F7E1FC14B84B}"/>
                 </a:ext>
                 <a:ext uri="{C183D7F6-B498-43B3-948B-1728B52AA6E4}">
-                  <adec:decorative xmlns:adec="http://schemas.microsoft.com/office/drawing/2017/decorative" val="1"/>
+                  <adec:decorative xmlns:adec="http://schemas.microsoft.com/office/drawing/2017/decorative" xmlns="" val="1"/>
                 </a:ext>
               </a:extLst>
             </p:cNvPr>
@@ -13838,7 +13838,7 @@
                   <a16:creationId xmlns:a16="http://schemas.microsoft.com/office/drawing/2014/main" id="{6115B885-5742-431C-BA48-96FC1F6D2280}"/>
                 </a:ext>
                 <a:ext uri="{C183D7F6-B498-43B3-948B-1728B52AA6E4}">
-                  <adec:decorative xmlns:adec="http://schemas.microsoft.com/office/drawing/2017/decorative" val="1"/>
+                  <adec:decorative xmlns:adec="http://schemas.microsoft.com/office/drawing/2017/decorative" xmlns="" val="1"/>
                 </a:ext>
               </a:extLst>
             </p:cNvPr>
@@ -13890,7 +13890,7 @@
                   <a16:creationId xmlns:a16="http://schemas.microsoft.com/office/drawing/2014/main" id="{6ACE37A6-0062-4B86-B4E6-18088040CDC9}"/>
                 </a:ext>
                 <a:ext uri="{C183D7F6-B498-43B3-948B-1728B52AA6E4}">
-                  <adec:decorative xmlns:adec="http://schemas.microsoft.com/office/drawing/2017/decorative" val="1"/>
+                  <adec:decorative xmlns:adec="http://schemas.microsoft.com/office/drawing/2017/decorative" xmlns="" val="1"/>
                 </a:ext>
               </a:extLst>
             </p:cNvPr>
@@ -13942,7 +13942,7 @@
                   <a16:creationId xmlns:a16="http://schemas.microsoft.com/office/drawing/2014/main" id="{0A8679B4-56BA-43AB-A0A2-E2DA3E205303}"/>
                 </a:ext>
                 <a:ext uri="{C183D7F6-B498-43B3-948B-1728B52AA6E4}">
-                  <adec:decorative xmlns:adec="http://schemas.microsoft.com/office/drawing/2017/decorative" val="1"/>
+                  <adec:decorative xmlns:adec="http://schemas.microsoft.com/office/drawing/2017/decorative" xmlns="" val="1"/>
                 </a:ext>
               </a:extLst>
             </p:cNvPr>
@@ -13994,7 +13994,7 @@
                   <a16:creationId xmlns:a16="http://schemas.microsoft.com/office/drawing/2014/main" id="{80DE24D2-627B-4C47-A858-A572BCDBACF6}"/>
                 </a:ext>
                 <a:ext uri="{C183D7F6-B498-43B3-948B-1728B52AA6E4}">
-                  <adec:decorative xmlns:adec="http://schemas.microsoft.com/office/drawing/2017/decorative" val="1"/>
+                  <adec:decorative xmlns:adec="http://schemas.microsoft.com/office/drawing/2017/decorative" xmlns="" val="1"/>
                 </a:ext>
               </a:extLst>
             </p:cNvPr>
@@ -14046,7 +14046,7 @@
                   <a16:creationId xmlns:a16="http://schemas.microsoft.com/office/drawing/2014/main" id="{B612A33E-5DE0-4E4D-9469-0BD0B3E0E72E}"/>
                 </a:ext>
                 <a:ext uri="{C183D7F6-B498-43B3-948B-1728B52AA6E4}">
-                  <adec:decorative xmlns:adec="http://schemas.microsoft.com/office/drawing/2017/decorative" val="1"/>
+                  <adec:decorative xmlns:adec="http://schemas.microsoft.com/office/drawing/2017/decorative" xmlns="" val="1"/>
                 </a:ext>
               </a:extLst>
             </p:cNvPr>
@@ -14098,7 +14098,7 @@
                   <a16:creationId xmlns:a16="http://schemas.microsoft.com/office/drawing/2014/main" id="{91673515-5E42-490F-85A0-45658D81C6CA}"/>
                 </a:ext>
                 <a:ext uri="{C183D7F6-B498-43B3-948B-1728B52AA6E4}">
-                  <adec:decorative xmlns:adec="http://schemas.microsoft.com/office/drawing/2017/decorative" val="1"/>
+                  <adec:decorative xmlns:adec="http://schemas.microsoft.com/office/drawing/2017/decorative" xmlns="" val="1"/>
                 </a:ext>
               </a:extLst>
             </p:cNvPr>
@@ -14150,7 +14150,7 @@
                   <a16:creationId xmlns:a16="http://schemas.microsoft.com/office/drawing/2014/main" id="{6B048C17-3768-4DAF-A7AE-B2E717497021}"/>
                 </a:ext>
                 <a:ext uri="{C183D7F6-B498-43B3-948B-1728B52AA6E4}">
-                  <adec:decorative xmlns:adec="http://schemas.microsoft.com/office/drawing/2017/decorative" val="1"/>
+                  <adec:decorative xmlns:adec="http://schemas.microsoft.com/office/drawing/2017/decorative" xmlns="" val="1"/>
                 </a:ext>
               </a:extLst>
             </p:cNvPr>
@@ -14202,7 +14202,7 @@
                   <a16:creationId xmlns:a16="http://schemas.microsoft.com/office/drawing/2014/main" id="{BAA4E6AA-9D65-4EED-91CB-87A5762ED0A4}"/>
                 </a:ext>
                 <a:ext uri="{C183D7F6-B498-43B3-948B-1728B52AA6E4}">
-                  <adec:decorative xmlns:adec="http://schemas.microsoft.com/office/drawing/2017/decorative" val="1"/>
+                  <adec:decorative xmlns:adec="http://schemas.microsoft.com/office/drawing/2017/decorative" xmlns="" val="1"/>
                 </a:ext>
               </a:extLst>
             </p:cNvPr>
@@ -14254,7 +14254,7 @@
                   <a16:creationId xmlns:a16="http://schemas.microsoft.com/office/drawing/2014/main" id="{DB48B9EB-BBF2-48D7-A1D7-720D94506BF3}"/>
                 </a:ext>
                 <a:ext uri="{C183D7F6-B498-43B3-948B-1728B52AA6E4}">
-                  <adec:decorative xmlns:adec="http://schemas.microsoft.com/office/drawing/2017/decorative" val="1"/>
+                  <adec:decorative xmlns:adec="http://schemas.microsoft.com/office/drawing/2017/decorative" xmlns="" val="1"/>
                 </a:ext>
               </a:extLst>
             </p:cNvPr>
@@ -14306,7 +14306,7 @@
                   <a16:creationId xmlns:a16="http://schemas.microsoft.com/office/drawing/2014/main" id="{21492B79-7338-4309-8667-BB29A7BC7B07}"/>
                 </a:ext>
                 <a:ext uri="{C183D7F6-B498-43B3-948B-1728B52AA6E4}">
-                  <adec:decorative xmlns:adec="http://schemas.microsoft.com/office/drawing/2017/decorative" val="1"/>
+                  <adec:decorative xmlns:adec="http://schemas.microsoft.com/office/drawing/2017/decorative" xmlns="" val="1"/>
                 </a:ext>
               </a:extLst>
             </p:cNvPr>
@@ -14358,7 +14358,7 @@
                   <a16:creationId xmlns:a16="http://schemas.microsoft.com/office/drawing/2014/main" id="{0352FD87-EC9C-4EB5-9ACC-A152F78FC815}"/>
                 </a:ext>
                 <a:ext uri="{C183D7F6-B498-43B3-948B-1728B52AA6E4}">
-                  <adec:decorative xmlns:adec="http://schemas.microsoft.com/office/drawing/2017/decorative" val="1"/>
+                  <adec:decorative xmlns:adec="http://schemas.microsoft.com/office/drawing/2017/decorative" xmlns="" val="1"/>
                 </a:ext>
               </a:extLst>
             </p:cNvPr>
@@ -14410,7 +14410,7 @@
                   <a16:creationId xmlns:a16="http://schemas.microsoft.com/office/drawing/2014/main" id="{FF2CEA1F-EFA8-4353-B5F8-CCE27955A123}"/>
                 </a:ext>
                 <a:ext uri="{C183D7F6-B498-43B3-948B-1728B52AA6E4}">
-                  <adec:decorative xmlns:adec="http://schemas.microsoft.com/office/drawing/2017/decorative" val="1"/>
+                  <adec:decorative xmlns:adec="http://schemas.microsoft.com/office/drawing/2017/decorative" xmlns="" val="1"/>
                 </a:ext>
               </a:extLst>
             </p:cNvPr>
@@ -14462,7 +14462,7 @@
                   <a16:creationId xmlns:a16="http://schemas.microsoft.com/office/drawing/2014/main" id="{63E2723F-2530-4636-9A19-8F11B156628C}"/>
                 </a:ext>
                 <a:ext uri="{C183D7F6-B498-43B3-948B-1728B52AA6E4}">
-                  <adec:decorative xmlns:adec="http://schemas.microsoft.com/office/drawing/2017/decorative" val="1"/>
+                  <adec:decorative xmlns:adec="http://schemas.microsoft.com/office/drawing/2017/decorative" xmlns="" val="1"/>
                 </a:ext>
               </a:extLst>
             </p:cNvPr>
@@ -14514,7 +14514,7 @@
                   <a16:creationId xmlns:a16="http://schemas.microsoft.com/office/drawing/2014/main" id="{4A9EE901-51C9-4292-BB45-5EDB8568A000}"/>
                 </a:ext>
                 <a:ext uri="{C183D7F6-B498-43B3-948B-1728B52AA6E4}">
-                  <adec:decorative xmlns:adec="http://schemas.microsoft.com/office/drawing/2017/decorative" val="1"/>
+                  <adec:decorative xmlns:adec="http://schemas.microsoft.com/office/drawing/2017/decorative" xmlns="" val="1"/>
                 </a:ext>
               </a:extLst>
             </p:cNvPr>
@@ -14566,7 +14566,7 @@
                   <a16:creationId xmlns:a16="http://schemas.microsoft.com/office/drawing/2014/main" id="{555407C2-7321-48CD-811F-92C71F701C28}"/>
                 </a:ext>
                 <a:ext uri="{C183D7F6-B498-43B3-948B-1728B52AA6E4}">
-                  <adec:decorative xmlns:adec="http://schemas.microsoft.com/office/drawing/2017/decorative" val="1"/>
+                  <adec:decorative xmlns:adec="http://schemas.microsoft.com/office/drawing/2017/decorative" xmlns="" val="1"/>
                 </a:ext>
               </a:extLst>
             </p:cNvPr>
@@ -14618,7 +14618,7 @@
                   <a16:creationId xmlns:a16="http://schemas.microsoft.com/office/drawing/2014/main" id="{E5298A8A-2787-4153-BDA2-E939BFD51412}"/>
                 </a:ext>
                 <a:ext uri="{C183D7F6-B498-43B3-948B-1728B52AA6E4}">
-                  <adec:decorative xmlns:adec="http://schemas.microsoft.com/office/drawing/2017/decorative" val="1"/>
+                  <adec:decorative xmlns:adec="http://schemas.microsoft.com/office/drawing/2017/decorative" xmlns="" val="1"/>
                 </a:ext>
               </a:extLst>
             </p:cNvPr>
@@ -14670,7 +14670,7 @@
                   <a16:creationId xmlns:a16="http://schemas.microsoft.com/office/drawing/2014/main" id="{C45057B3-3FAB-42ED-AF52-F00BB07FA52B}"/>
                 </a:ext>
                 <a:ext uri="{C183D7F6-B498-43B3-948B-1728B52AA6E4}">
-                  <adec:decorative xmlns:adec="http://schemas.microsoft.com/office/drawing/2017/decorative" val="1"/>
+                  <adec:decorative xmlns:adec="http://schemas.microsoft.com/office/drawing/2017/decorative" xmlns="" val="1"/>
                 </a:ext>
               </a:extLst>
             </p:cNvPr>
@@ -14722,7 +14722,7 @@
                   <a16:creationId xmlns:a16="http://schemas.microsoft.com/office/drawing/2014/main" id="{DA3F09E9-F476-4352-90E3-6A15C74268B9}"/>
                 </a:ext>
                 <a:ext uri="{C183D7F6-B498-43B3-948B-1728B52AA6E4}">
-                  <adec:decorative xmlns:adec="http://schemas.microsoft.com/office/drawing/2017/decorative" val="1"/>
+                  <adec:decorative xmlns:adec="http://schemas.microsoft.com/office/drawing/2017/decorative" xmlns="" val="1"/>
                 </a:ext>
               </a:extLst>
             </p:cNvPr>
@@ -14774,7 +14774,7 @@
                   <a16:creationId xmlns:a16="http://schemas.microsoft.com/office/drawing/2014/main" id="{128F7C5C-CECC-45A8-8A1F-D679534D4CBA}"/>
                 </a:ext>
                 <a:ext uri="{C183D7F6-B498-43B3-948B-1728B52AA6E4}">
-                  <adec:decorative xmlns:adec="http://schemas.microsoft.com/office/drawing/2017/decorative" val="1"/>
+                  <adec:decorative xmlns:adec="http://schemas.microsoft.com/office/drawing/2017/decorative" xmlns="" val="1"/>
                 </a:ext>
               </a:extLst>
             </p:cNvPr>
@@ -14826,7 +14826,7 @@
                   <a16:creationId xmlns:a16="http://schemas.microsoft.com/office/drawing/2014/main" id="{FFFDFE9C-2017-4831-9F1B-6A03B58B10DE}"/>
                 </a:ext>
                 <a:ext uri="{C183D7F6-B498-43B3-948B-1728B52AA6E4}">
-                  <adec:decorative xmlns:adec="http://schemas.microsoft.com/office/drawing/2017/decorative" val="1"/>
+                  <adec:decorative xmlns:adec="http://schemas.microsoft.com/office/drawing/2017/decorative" xmlns="" val="1"/>
                 </a:ext>
               </a:extLst>
             </p:cNvPr>
@@ -14878,7 +14878,7 @@
                   <a16:creationId xmlns:a16="http://schemas.microsoft.com/office/drawing/2014/main" id="{01BC942F-09CF-4A51-85A5-E23E2D71C8C8}"/>
                 </a:ext>
                 <a:ext uri="{C183D7F6-B498-43B3-948B-1728B52AA6E4}">
-                  <adec:decorative xmlns:adec="http://schemas.microsoft.com/office/drawing/2017/decorative" val="1"/>
+                  <adec:decorative xmlns:adec="http://schemas.microsoft.com/office/drawing/2017/decorative" xmlns="" val="1"/>
                 </a:ext>
               </a:extLst>
             </p:cNvPr>
@@ -14930,7 +14930,7 @@
                   <a16:creationId xmlns:a16="http://schemas.microsoft.com/office/drawing/2014/main" id="{1456B520-137F-484D-A1B1-7DA5C3F823E6}"/>
                 </a:ext>
                 <a:ext uri="{C183D7F6-B498-43B3-948B-1728B52AA6E4}">
-                  <adec:decorative xmlns:adec="http://schemas.microsoft.com/office/drawing/2017/decorative" val="1"/>
+                  <adec:decorative xmlns:adec="http://schemas.microsoft.com/office/drawing/2017/decorative" xmlns="" val="1"/>
                 </a:ext>
               </a:extLst>
             </p:cNvPr>
@@ -14982,7 +14982,7 @@
                   <a16:creationId xmlns:a16="http://schemas.microsoft.com/office/drawing/2014/main" id="{9ECA29F0-381E-4770-97BF-54C4E52201C4}"/>
                 </a:ext>
                 <a:ext uri="{C183D7F6-B498-43B3-948B-1728B52AA6E4}">
-                  <adec:decorative xmlns:adec="http://schemas.microsoft.com/office/drawing/2017/decorative" val="1"/>
+                  <adec:decorative xmlns:adec="http://schemas.microsoft.com/office/drawing/2017/decorative" xmlns="" val="1"/>
                 </a:ext>
               </a:extLst>
             </p:cNvPr>
@@ -15034,7 +15034,7 @@
                   <a16:creationId xmlns:a16="http://schemas.microsoft.com/office/drawing/2014/main" id="{D43CCF9F-8F11-4676-82F3-DEE8A48C8567}"/>
                 </a:ext>
                 <a:ext uri="{C183D7F6-B498-43B3-948B-1728B52AA6E4}">
-                  <adec:decorative xmlns:adec="http://schemas.microsoft.com/office/drawing/2017/decorative" val="1"/>
+                  <adec:decorative xmlns:adec="http://schemas.microsoft.com/office/drawing/2017/decorative" xmlns="" val="1"/>
                 </a:ext>
               </a:extLst>
             </p:cNvPr>
@@ -15086,7 +15086,7 @@
                   <a16:creationId xmlns:a16="http://schemas.microsoft.com/office/drawing/2014/main" id="{6FA620FD-6A45-4754-BF42-A9FA44966DD9}"/>
                 </a:ext>
                 <a:ext uri="{C183D7F6-B498-43B3-948B-1728B52AA6E4}">
-                  <adec:decorative xmlns:adec="http://schemas.microsoft.com/office/drawing/2017/decorative" val="1"/>
+                  <adec:decorative xmlns:adec="http://schemas.microsoft.com/office/drawing/2017/decorative" xmlns="" val="1"/>
                 </a:ext>
               </a:extLst>
             </p:cNvPr>
@@ -15138,7 +15138,7 @@
                   <a16:creationId xmlns:a16="http://schemas.microsoft.com/office/drawing/2014/main" id="{DC4D38F3-F3A2-42F4-8B57-DE978EC4AD5A}"/>
                 </a:ext>
                 <a:ext uri="{C183D7F6-B498-43B3-948B-1728B52AA6E4}">
-                  <adec:decorative xmlns:adec="http://schemas.microsoft.com/office/drawing/2017/decorative" val="1"/>
+                  <adec:decorative xmlns:adec="http://schemas.microsoft.com/office/drawing/2017/decorative" xmlns="" val="1"/>
                 </a:ext>
               </a:extLst>
             </p:cNvPr>
@@ -15190,7 +15190,7 @@
                   <a16:creationId xmlns:a16="http://schemas.microsoft.com/office/drawing/2014/main" id="{3C26D30E-A91E-4A5B-A419-0B9D79D57CED}"/>
                 </a:ext>
                 <a:ext uri="{C183D7F6-B498-43B3-948B-1728B52AA6E4}">
-                  <adec:decorative xmlns:adec="http://schemas.microsoft.com/office/drawing/2017/decorative" val="1"/>
+                  <adec:decorative xmlns:adec="http://schemas.microsoft.com/office/drawing/2017/decorative" xmlns="" val="1"/>
                 </a:ext>
               </a:extLst>
             </p:cNvPr>
@@ -15242,7 +15242,7 @@
                   <a16:creationId xmlns:a16="http://schemas.microsoft.com/office/drawing/2014/main" id="{ADAB3EBC-722A-462E-AAAE-506E50038ED8}"/>
                 </a:ext>
                 <a:ext uri="{C183D7F6-B498-43B3-948B-1728B52AA6E4}">
-                  <adec:decorative xmlns:adec="http://schemas.microsoft.com/office/drawing/2017/decorative" val="1"/>
+                  <adec:decorative xmlns:adec="http://schemas.microsoft.com/office/drawing/2017/decorative" xmlns="" val="1"/>
                 </a:ext>
               </a:extLst>
             </p:cNvPr>
@@ -15294,7 +15294,7 @@
                   <a16:creationId xmlns:a16="http://schemas.microsoft.com/office/drawing/2014/main" id="{CBAABC17-832F-48CF-B0D7-0F7DE54607F5}"/>
                 </a:ext>
                 <a:ext uri="{C183D7F6-B498-43B3-948B-1728B52AA6E4}">
-                  <adec:decorative xmlns:adec="http://schemas.microsoft.com/office/drawing/2017/decorative" val="1"/>
+                  <adec:decorative xmlns:adec="http://schemas.microsoft.com/office/drawing/2017/decorative" xmlns="" val="1"/>
                 </a:ext>
               </a:extLst>
             </p:cNvPr>
@@ -15346,7 +15346,7 @@
                   <a16:creationId xmlns:a16="http://schemas.microsoft.com/office/drawing/2014/main" id="{E1FCA513-75D7-414B-BE8F-D780746A1A66}"/>
                 </a:ext>
                 <a:ext uri="{C183D7F6-B498-43B3-948B-1728B52AA6E4}">
-                  <adec:decorative xmlns:adec="http://schemas.microsoft.com/office/drawing/2017/decorative" val="1"/>
+                  <adec:decorative xmlns:adec="http://schemas.microsoft.com/office/drawing/2017/decorative" xmlns="" val="1"/>
                 </a:ext>
               </a:extLst>
             </p:cNvPr>
@@ -15398,7 +15398,7 @@
                   <a16:creationId xmlns:a16="http://schemas.microsoft.com/office/drawing/2014/main" id="{F2EDEC73-B6F5-473F-934A-CEF57604A8A4}"/>
                 </a:ext>
                 <a:ext uri="{C183D7F6-B498-43B3-948B-1728B52AA6E4}">
-                  <adec:decorative xmlns:adec="http://schemas.microsoft.com/office/drawing/2017/decorative" val="1"/>
+                  <adec:decorative xmlns:adec="http://schemas.microsoft.com/office/drawing/2017/decorative" xmlns="" val="1"/>
                 </a:ext>
               </a:extLst>
             </p:cNvPr>
@@ -15450,7 +15450,7 @@
                   <a16:creationId xmlns:a16="http://schemas.microsoft.com/office/drawing/2014/main" id="{5B987884-C452-4492-A9F8-2770D3373BF9}"/>
                 </a:ext>
                 <a:ext uri="{C183D7F6-B498-43B3-948B-1728B52AA6E4}">
-                  <adec:decorative xmlns:adec="http://schemas.microsoft.com/office/drawing/2017/decorative" val="1"/>
+                  <adec:decorative xmlns:adec="http://schemas.microsoft.com/office/drawing/2017/decorative" xmlns="" val="1"/>
                 </a:ext>
               </a:extLst>
             </p:cNvPr>
@@ -15502,7 +15502,7 @@
                   <a16:creationId xmlns:a16="http://schemas.microsoft.com/office/drawing/2014/main" id="{9D978AF2-B7BB-4E05-81F1-1A5DBD1CB4EF}"/>
                 </a:ext>
                 <a:ext uri="{C183D7F6-B498-43B3-948B-1728B52AA6E4}">
-                  <adec:decorative xmlns:adec="http://schemas.microsoft.com/office/drawing/2017/decorative" val="1"/>
+                  <adec:decorative xmlns:adec="http://schemas.microsoft.com/office/drawing/2017/decorative" xmlns="" val="1"/>
                 </a:ext>
               </a:extLst>
             </p:cNvPr>
@@ -15554,7 +15554,7 @@
                   <a16:creationId xmlns:a16="http://schemas.microsoft.com/office/drawing/2014/main" id="{D7AD4D45-C3AB-458E-B826-0FACBD0DF3AF}"/>
                 </a:ext>
                 <a:ext uri="{C183D7F6-B498-43B3-948B-1728B52AA6E4}">
-                  <adec:decorative xmlns:adec="http://schemas.microsoft.com/office/drawing/2017/decorative" val="1"/>
+                  <adec:decorative xmlns:adec="http://schemas.microsoft.com/office/drawing/2017/decorative" xmlns="" val="1"/>
                 </a:ext>
               </a:extLst>
             </p:cNvPr>
@@ -15606,7 +15606,7 @@
                   <a16:creationId xmlns:a16="http://schemas.microsoft.com/office/drawing/2014/main" id="{A6E15555-6738-463C-B7DF-86429F2F9677}"/>
                 </a:ext>
                 <a:ext uri="{C183D7F6-B498-43B3-948B-1728B52AA6E4}">
-                  <adec:decorative xmlns:adec="http://schemas.microsoft.com/office/drawing/2017/decorative" val="1"/>
+                  <adec:decorative xmlns:adec="http://schemas.microsoft.com/office/drawing/2017/decorative" xmlns="" val="1"/>
                 </a:ext>
               </a:extLst>
             </p:cNvPr>
@@ -15658,7 +15658,7 @@
                   <a16:creationId xmlns:a16="http://schemas.microsoft.com/office/drawing/2014/main" id="{AE487172-B4C3-4D13-A562-EF0BA3DD961F}"/>
                 </a:ext>
                 <a:ext uri="{C183D7F6-B498-43B3-948B-1728B52AA6E4}">
-                  <adec:decorative xmlns:adec="http://schemas.microsoft.com/office/drawing/2017/decorative" val="1"/>
+                  <adec:decorative xmlns:adec="http://schemas.microsoft.com/office/drawing/2017/decorative" xmlns="" val="1"/>
                 </a:ext>
               </a:extLst>
             </p:cNvPr>
@@ -15710,7 +15710,7 @@
                   <a16:creationId xmlns:a16="http://schemas.microsoft.com/office/drawing/2014/main" id="{08E66297-1295-432A-AA84-7BB2341C1932}"/>
                 </a:ext>
                 <a:ext uri="{C183D7F6-B498-43B3-948B-1728B52AA6E4}">
-                  <adec:decorative xmlns:adec="http://schemas.microsoft.com/office/drawing/2017/decorative" val="1"/>
+                  <adec:decorative xmlns:adec="http://schemas.microsoft.com/office/drawing/2017/decorative" xmlns="" val="1"/>
                 </a:ext>
               </a:extLst>
             </p:cNvPr>
@@ -16202,13 +16202,42 @@
               <a:buNone/>
             </a:pPr>
             <a:r>
-              <a:rPr lang="he-IL" sz="3600"/>
-              <a:t>מערכת מודולרית הבנויה על פלטפורמה מרכזית אחת אליה מחוברים כלי בדיקה שונים.</a:t>
-            </a:r>
+              <a:rPr lang="he-IL" sz="2800" dirty="0"/>
+              <a:t>מערכת מודולרית הבנויה על פלטפורמה מרכזית אחת אליה מחוברים כלי בדיקה </a:t>
+            </a:r>
+            <a:r>
+              <a:rPr lang="he-IL" sz="2800" dirty="0" smtClean="0"/>
+              <a:t>שונים</a:t>
+            </a:r>
+            <a:endParaRPr lang="en-US" sz="2800" dirty="0" smtClean="0"/>
+          </a:p>
+          <a:p>
+            <a:pPr marL="0" indent="0" algn="r" rtl="1">
+              <a:buNone/>
+            </a:pPr>
+            <a:r>
+              <a:rPr lang="he-IL" sz="2800" dirty="0" smtClean="0"/>
+              <a:t>הפלטפורמה תבצע את רוב בדיקות התכנה הסטטיות. והכלים יסתמכו על המידע שהפלטפורמה תאגור לפי בדיקותיה וישתמשו בבדיקות אלו.</a:t>
+            </a:r>
+          </a:p>
+          <a:p>
+            <a:pPr marL="0" indent="0" algn="r" rtl="1">
+              <a:buNone/>
+            </a:pPr>
+            <a:r>
+              <a:rPr lang="he-IL" sz="2800" dirty="0" smtClean="0"/>
+              <a:t>כלי הוא למעשה בדיקה עוד רצף בדיקות אשר יותר ספציפיות ויולות אפילו לשנות את הקוד במקרה הצורך (תלוי בכלי).</a:t>
+            </a:r>
+          </a:p>
+          <a:p>
+            <a:pPr marL="0" indent="0" algn="r" rtl="1">
+              <a:buNone/>
+            </a:pPr>
+            <a:endParaRPr lang="he-IL" sz="3600" dirty="0"/>
           </a:p>
           <a:p>
             <a:pPr algn="r" rtl="1"/>
-            <a:endParaRPr lang="he-IL"/>
+            <a:endParaRPr lang="he-IL" dirty="0"/>
           </a:p>
         </p:txBody>
       </p:sp>
@@ -16444,14 +16473,14 @@
             <p:ph idx="1"/>
             <p:extLst>
               <p:ext uri="{D42A27DB-BD31-4B8C-83A1-F6EECF244321}">
-                <p14:modId xmlns:p14="http://schemas.microsoft.com/office/powerpoint/2010/main" val="1348683866"/>
+                <p14:modId xmlns:p14="http://schemas.microsoft.com/office/powerpoint/2010/main" val="1938406591"/>
               </p:ext>
             </p:extLst>
           </p:nvPr>
         </p:nvGraphicFramePr>
         <p:xfrm>
           <a:off x="327171" y="226060"/>
-          <a:ext cx="10131423" cy="6405880"/>
+          <a:ext cx="10131423" cy="6680200"/>
         </p:xfrm>
         <a:graphic>
           <a:graphicData uri="http://schemas.openxmlformats.org/drawingml/2006/table">
@@ -16666,7 +16695,7 @@
                         <a:buAutoNum type="arabicPeriod"/>
                       </a:pPr>
                       <a:r>
-                        <a:rPr lang="he-IL"/>
+                        <a:rPr lang="he-IL" dirty="0"/>
                         <a:t>יינתן תמיד לעדכן את הקוד ולהוסיף דברים חדשים.</a:t>
                       </a:r>
                     </a:p>
@@ -16675,16 +16704,29 @@
                         <a:buAutoNum type="arabicPeriod"/>
                       </a:pPr>
                       <a:r>
-                        <a:rPr lang="he-IL"/>
-                        <a:t>בגלל שיש חלוקה בין כלים לתוכנה עצמה הבודקת, תמיד ניתן להוסיף כלים למחוק כלים ולעדכן כלים ובכך להתאים כלים לפי הצורך.</a:t>
+                        <a:rPr lang="he-IL" dirty="0"/>
+                        <a:t>בגלל שיש חלוקה בין כלים לתוכנה עצמה הבודקת, תמיד ניתן להוסיף כלים למחוק כלים ולעדכן כלים ובכך להתאים כלים לפי הצורך</a:t>
                       </a:r>
+                      <a:r>
+                        <a:rPr lang="he-IL" dirty="0" smtClean="0"/>
+                        <a:t>. (כלי לדוגמא :כלי  לטיפול</a:t>
+                      </a:r>
+                      <a:r>
+                        <a:rPr lang="he-IL" baseline="0" dirty="0" smtClean="0"/>
+                        <a:t> בהקצאות זכרון</a:t>
+                      </a:r>
+                      <a:r>
+                        <a:rPr lang="he-IL" dirty="0" smtClean="0"/>
+                        <a:t>)</a:t>
+                      </a:r>
+                      <a:endParaRPr lang="he-IL" dirty="0"/>
                     </a:p>
                     <a:p>
                       <a:pPr marL="342900" indent="-342900" algn="r" rtl="1">
                         <a:buAutoNum type="arabicPeriod"/>
                       </a:pPr>
                       <a:r>
-                        <a:rPr lang="he-IL"/>
+                        <a:rPr lang="he-IL" dirty="0"/>
                         <a:t>המערכת לא תלויה בקוד חיצוני שמוסיף תלות בגורם חיצוני.</a:t>
                       </a:r>
                     </a:p>
@@ -16761,18 +16803,18 @@
                     <a:p>
                       <a:pPr algn="r" rtl="1"/>
                       <a:r>
-                        <a:rPr lang="he-IL"/>
+                        <a:rPr lang="he-IL" dirty="0"/>
                         <a:t>3. להשתמש בחלקים מובנים של קומפיילרים ולבנות </a:t>
                       </a:r>
                       <a:r>
-                        <a:rPr lang="he-IL" err="1"/>
+                        <a:rPr lang="he-IL" dirty="0" err="1"/>
                         <a:t>פלאגין</a:t>
                       </a:r>
                       <a:r>
-                        <a:rPr lang="he-IL"/>
+                        <a:rPr lang="he-IL" dirty="0"/>
                         <a:t> שמחבר בין בדיקת הקומפילציה לבין הניתוח עצמו.</a:t>
                       </a:r>
-                      <a:endParaRPr lang="en-IL"/>
+                      <a:endParaRPr lang="en-IL" dirty="0"/>
                     </a:p>
                   </a:txBody>
                   <a:tcPr/>

</xml_diff>